<commit_message>
Week 3 work DMFT paper error analysis
</commit_message>
<xml_diff>
--- a/Annanay Project Summary.pptx
+++ b/Annanay Project Summary.pptx
@@ -27,7 +27,14 @@
     <p:sldId id="274" r:id="rId21"/>
     <p:sldId id="280" r:id="rId22"/>
     <p:sldId id="277" r:id="rId23"/>
-    <p:sldId id="283" r:id="rId24"/>
+    <p:sldId id="284" r:id="rId24"/>
+    <p:sldId id="290" r:id="rId25"/>
+    <p:sldId id="285" r:id="rId26"/>
+    <p:sldId id="286" r:id="rId27"/>
+    <p:sldId id="289" r:id="rId28"/>
+    <p:sldId id="287" r:id="rId29"/>
+    <p:sldId id="288" r:id="rId30"/>
+    <p:sldId id="283" r:id="rId31"/>
   </p:sldIdLst>
   <p:sldSz cx="12192000" cy="6858000"/>
   <p:notesSz cx="6858000" cy="9144000"/>
@@ -161,6 +168,13 @@
         </p14:section>
         <p14:section name="Week 3" id="{E0B379A0-9C27-49D7-A943-A114DC5D1306}">
           <p14:sldIdLst>
+            <p14:sldId id="284"/>
+            <p14:sldId id="290"/>
+            <p14:sldId id="285"/>
+            <p14:sldId id="286"/>
+            <p14:sldId id="289"/>
+            <p14:sldId id="287"/>
+            <p14:sldId id="288"/>
             <p14:sldId id="283"/>
           </p14:sldIdLst>
         </p14:section>
@@ -176,7 +190,7 @@
 <file path=ppt/revisionInfo.xml><?xml version="1.0" encoding="utf-8"?>
 <p1510:revInfo xmlns:a="http://schemas.openxmlformats.org/drawingml/2006/main" xmlns:r="http://schemas.openxmlformats.org/officeDocument/2006/relationships" xmlns:p1510="http://schemas.microsoft.com/office/powerpoint/2015/10/main">
   <p1510:revLst>
-    <p1510:client id="{40A5659F-09DE-4485-9DDA-1A4205ADF249}" v="59" dt="2020-06-18T16:56:24.172"/>
+    <p1510:client id="{40A5659F-09DE-4485-9DDA-1A4205ADF249}" v="101" dt="2020-06-23T16:26:50.980"/>
   </p1510:revLst>
 </p1510:revInfo>
 </file>
@@ -186,7 +200,7 @@
   <pc:docChgLst>
     <pc:chgData name="Annanay Kapila" userId="333c25d8f56949d8" providerId="LiveId" clId="{40A5659F-09DE-4485-9DDA-1A4205ADF249}"/>
     <pc:docChg chg="undo custSel mod addSld delSld modSld sldOrd addSection delSection modSection">
-      <pc:chgData name="Annanay Kapila" userId="333c25d8f56949d8" providerId="LiveId" clId="{40A5659F-09DE-4485-9DDA-1A4205ADF249}" dt="2020-06-18T19:11:39.096" v="4554" actId="680"/>
+      <pc:chgData name="Annanay Kapila" userId="333c25d8f56949d8" providerId="LiveId" clId="{40A5659F-09DE-4485-9DDA-1A4205ADF249}" dt="2020-06-23T16:41:16.073" v="7469" actId="20577"/>
       <pc:docMkLst>
         <pc:docMk/>
       </pc:docMkLst>
@@ -1069,12 +1083,444 @@
           </ac:picMkLst>
         </pc:picChg>
       </pc:sldChg>
-      <pc:sldChg chg="new">
-        <pc:chgData name="Annanay Kapila" userId="333c25d8f56949d8" providerId="LiveId" clId="{40A5659F-09DE-4485-9DDA-1A4205ADF249}" dt="2020-06-18T19:11:39.096" v="4554" actId="680"/>
+      <pc:sldChg chg="modSp new mod">
+        <pc:chgData name="Annanay Kapila" userId="333c25d8f56949d8" providerId="LiveId" clId="{40A5659F-09DE-4485-9DDA-1A4205ADF249}" dt="2020-06-23T10:36:40.247" v="6168" actId="20577"/>
         <pc:sldMkLst>
           <pc:docMk/>
           <pc:sldMk cId="1720655337" sldId="283"/>
         </pc:sldMkLst>
+        <pc:spChg chg="mod">
+          <ac:chgData name="Annanay Kapila" userId="333c25d8f56949d8" providerId="LiveId" clId="{40A5659F-09DE-4485-9DDA-1A4205ADF249}" dt="2020-06-20T19:03:37.207" v="5320" actId="20577"/>
+          <ac:spMkLst>
+            <pc:docMk/>
+            <pc:sldMk cId="1720655337" sldId="283"/>
+            <ac:spMk id="2" creationId="{A8B8131F-68B2-47CA-A578-BAC440340A2C}"/>
+          </ac:spMkLst>
+        </pc:spChg>
+        <pc:spChg chg="mod">
+          <ac:chgData name="Annanay Kapila" userId="333c25d8f56949d8" providerId="LiveId" clId="{40A5659F-09DE-4485-9DDA-1A4205ADF249}" dt="2020-06-23T10:36:40.247" v="6168" actId="20577"/>
+          <ac:spMkLst>
+            <pc:docMk/>
+            <pc:sldMk cId="1720655337" sldId="283"/>
+            <ac:spMk id="3" creationId="{E3ED8E95-F065-4FC0-8E66-31032FAC5DB9}"/>
+          </ac:spMkLst>
+        </pc:spChg>
+      </pc:sldChg>
+      <pc:sldChg chg="modSp new mod ord">
+        <pc:chgData name="Annanay Kapila" userId="333c25d8f56949d8" providerId="LiveId" clId="{40A5659F-09DE-4485-9DDA-1A4205ADF249}" dt="2020-06-23T16:41:16.073" v="7469" actId="20577"/>
+        <pc:sldMkLst>
+          <pc:docMk/>
+          <pc:sldMk cId="3868363432" sldId="284"/>
+        </pc:sldMkLst>
+        <pc:spChg chg="mod">
+          <ac:chgData name="Annanay Kapila" userId="333c25d8f56949d8" providerId="LiveId" clId="{40A5659F-09DE-4485-9DDA-1A4205ADF249}" dt="2020-06-23T12:33:33.432" v="6393" actId="20577"/>
+          <ac:spMkLst>
+            <pc:docMk/>
+            <pc:sldMk cId="3868363432" sldId="284"/>
+            <ac:spMk id="2" creationId="{0EB91AD2-0E80-4BE5-886E-652826580461}"/>
+          </ac:spMkLst>
+        </pc:spChg>
+        <pc:spChg chg="mod">
+          <ac:chgData name="Annanay Kapila" userId="333c25d8f56949d8" providerId="LiveId" clId="{40A5659F-09DE-4485-9DDA-1A4205ADF249}" dt="2020-06-23T16:41:16.073" v="7469" actId="20577"/>
+          <ac:spMkLst>
+            <pc:docMk/>
+            <pc:sldMk cId="3868363432" sldId="284"/>
+            <ac:spMk id="3" creationId="{D19CA2AF-D05D-4EDA-AF6F-78C0E7E8C944}"/>
+          </ac:spMkLst>
+        </pc:spChg>
+      </pc:sldChg>
+      <pc:sldChg chg="addSp delSp modSp new mod">
+        <pc:chgData name="Annanay Kapila" userId="333c25d8f56949d8" providerId="LiveId" clId="{40A5659F-09DE-4485-9DDA-1A4205ADF249}" dt="2020-06-21T20:43:54.010" v="5858" actId="14100"/>
+        <pc:sldMkLst>
+          <pc:docMk/>
+          <pc:sldMk cId="1358112946" sldId="285"/>
+        </pc:sldMkLst>
+        <pc:spChg chg="mod">
+          <ac:chgData name="Annanay Kapila" userId="333c25d8f56949d8" providerId="LiveId" clId="{40A5659F-09DE-4485-9DDA-1A4205ADF249}" dt="2020-06-21T15:42:46.218" v="5676" actId="1076"/>
+          <ac:spMkLst>
+            <pc:docMk/>
+            <pc:sldMk cId="1358112946" sldId="285"/>
+            <ac:spMk id="2" creationId="{07C57F7F-85AE-4014-B74C-A87F2EC2AC22}"/>
+          </ac:spMkLst>
+        </pc:spChg>
+        <pc:spChg chg="mod">
+          <ac:chgData name="Annanay Kapila" userId="333c25d8f56949d8" providerId="LiveId" clId="{40A5659F-09DE-4485-9DDA-1A4205ADF249}" dt="2020-06-21T15:42:49.442" v="5677" actId="1076"/>
+          <ac:spMkLst>
+            <pc:docMk/>
+            <pc:sldMk cId="1358112946" sldId="285"/>
+            <ac:spMk id="3" creationId="{8BF31A83-2F00-4880-A8BB-2D8D8D55F460}"/>
+          </ac:spMkLst>
+        </pc:spChg>
+        <pc:grpChg chg="add del mod">
+          <ac:chgData name="Annanay Kapila" userId="333c25d8f56949d8" providerId="LiveId" clId="{40A5659F-09DE-4485-9DDA-1A4205ADF249}" dt="2020-06-21T19:59:48.887" v="5692" actId="478"/>
+          <ac:grpSpMkLst>
+            <pc:docMk/>
+            <pc:sldMk cId="1358112946" sldId="285"/>
+            <ac:grpSpMk id="7" creationId="{D911166F-D7F8-4DA8-9BFE-4DC4DF644CA9}"/>
+          </ac:grpSpMkLst>
+        </pc:grpChg>
+        <pc:grpChg chg="add mod ord">
+          <ac:chgData name="Annanay Kapila" userId="333c25d8f56949d8" providerId="LiveId" clId="{40A5659F-09DE-4485-9DDA-1A4205ADF249}" dt="2020-06-21T20:43:54.010" v="5858" actId="14100"/>
+          <ac:grpSpMkLst>
+            <pc:docMk/>
+            <pc:sldMk cId="1358112946" sldId="285"/>
+            <ac:grpSpMk id="11" creationId="{D6EF708E-43A0-446A-A373-965546A2E447}"/>
+          </ac:grpSpMkLst>
+        </pc:grpChg>
+        <pc:picChg chg="add mod">
+          <ac:chgData name="Annanay Kapila" userId="333c25d8f56949d8" providerId="LiveId" clId="{40A5659F-09DE-4485-9DDA-1A4205ADF249}" dt="2020-06-21T15:43:18.078" v="5678" actId="164"/>
+          <ac:picMkLst>
+            <pc:docMk/>
+            <pc:sldMk cId="1358112946" sldId="285"/>
+            <ac:picMk id="4" creationId="{2728173B-3721-463C-9A74-3FF5422312E7}"/>
+          </ac:picMkLst>
+        </pc:picChg>
+        <pc:picChg chg="add mod">
+          <ac:chgData name="Annanay Kapila" userId="333c25d8f56949d8" providerId="LiveId" clId="{40A5659F-09DE-4485-9DDA-1A4205ADF249}" dt="2020-06-21T15:43:18.078" v="5678" actId="164"/>
+          <ac:picMkLst>
+            <pc:docMk/>
+            <pc:sldMk cId="1358112946" sldId="285"/>
+            <ac:picMk id="5" creationId="{CB551911-E6BC-4414-A384-A62651AEFCDE}"/>
+          </ac:picMkLst>
+        </pc:picChg>
+        <pc:picChg chg="add mod">
+          <ac:chgData name="Annanay Kapila" userId="333c25d8f56949d8" providerId="LiveId" clId="{40A5659F-09DE-4485-9DDA-1A4205ADF249}" dt="2020-06-21T15:43:18.078" v="5678" actId="164"/>
+          <ac:picMkLst>
+            <pc:docMk/>
+            <pc:sldMk cId="1358112946" sldId="285"/>
+            <ac:picMk id="6" creationId="{D787F547-1659-4CEE-9F71-0D69F17B45CC}"/>
+          </ac:picMkLst>
+        </pc:picChg>
+        <pc:picChg chg="add mod">
+          <ac:chgData name="Annanay Kapila" userId="333c25d8f56949d8" providerId="LiveId" clId="{40A5659F-09DE-4485-9DDA-1A4205ADF249}" dt="2020-06-21T20:43:47.073" v="5856" actId="164"/>
+          <ac:picMkLst>
+            <pc:docMk/>
+            <pc:sldMk cId="1358112946" sldId="285"/>
+            <ac:picMk id="8" creationId="{BD88E926-8D08-499D-922E-CE7B94B48F31}"/>
+          </ac:picMkLst>
+        </pc:picChg>
+        <pc:picChg chg="add mod">
+          <ac:chgData name="Annanay Kapila" userId="333c25d8f56949d8" providerId="LiveId" clId="{40A5659F-09DE-4485-9DDA-1A4205ADF249}" dt="2020-06-21T20:43:47.073" v="5856" actId="164"/>
+          <ac:picMkLst>
+            <pc:docMk/>
+            <pc:sldMk cId="1358112946" sldId="285"/>
+            <ac:picMk id="9" creationId="{866DA005-25B2-49C8-9C8C-DF9770D5191F}"/>
+          </ac:picMkLst>
+        </pc:picChg>
+        <pc:picChg chg="add mod">
+          <ac:chgData name="Annanay Kapila" userId="333c25d8f56949d8" providerId="LiveId" clId="{40A5659F-09DE-4485-9DDA-1A4205ADF249}" dt="2020-06-21T20:43:47.073" v="5856" actId="164"/>
+          <ac:picMkLst>
+            <pc:docMk/>
+            <pc:sldMk cId="1358112946" sldId="285"/>
+            <ac:picMk id="10" creationId="{4924470D-621D-4B55-9F0C-6CFA51DECC55}"/>
+          </ac:picMkLst>
+        </pc:picChg>
+      </pc:sldChg>
+      <pc:sldChg chg="addSp modSp new mod">
+        <pc:chgData name="Annanay Kapila" userId="333c25d8f56949d8" providerId="LiveId" clId="{40A5659F-09DE-4485-9DDA-1A4205ADF249}" dt="2020-06-23T12:07:52.814" v="6176" actId="20577"/>
+        <pc:sldMkLst>
+          <pc:docMk/>
+          <pc:sldMk cId="563156703" sldId="286"/>
+        </pc:sldMkLst>
+        <pc:spChg chg="mod">
+          <ac:chgData name="Annanay Kapila" userId="333c25d8f56949d8" providerId="LiveId" clId="{40A5659F-09DE-4485-9DDA-1A4205ADF249}" dt="2020-06-21T15:45:33.474" v="5686" actId="20577"/>
+          <ac:spMkLst>
+            <pc:docMk/>
+            <pc:sldMk cId="563156703" sldId="286"/>
+            <ac:spMk id="2" creationId="{F2F0EE85-C29B-4646-9F04-0C9E48D7E666}"/>
+          </ac:spMkLst>
+        </pc:spChg>
+        <pc:spChg chg="mod">
+          <ac:chgData name="Annanay Kapila" userId="333c25d8f56949d8" providerId="LiveId" clId="{40A5659F-09DE-4485-9DDA-1A4205ADF249}" dt="2020-06-23T12:07:52.814" v="6176" actId="20577"/>
+          <ac:spMkLst>
+            <pc:docMk/>
+            <pc:sldMk cId="563156703" sldId="286"/>
+            <ac:spMk id="3" creationId="{FB5E14B9-118D-4B4F-9DDD-21DFE7AA73D2}"/>
+          </ac:spMkLst>
+        </pc:spChg>
+        <pc:grpChg chg="add mod ord">
+          <ac:chgData name="Annanay Kapila" userId="333c25d8f56949d8" providerId="LiveId" clId="{40A5659F-09DE-4485-9DDA-1A4205ADF249}" dt="2020-06-21T20:45:51.587" v="5892" actId="1076"/>
+          <ac:grpSpMkLst>
+            <pc:docMk/>
+            <pc:sldMk cId="563156703" sldId="286"/>
+            <ac:grpSpMk id="8" creationId="{D9D1A7F0-3C24-4F22-9C7A-8BD8D23B7ECD}"/>
+          </ac:grpSpMkLst>
+        </pc:grpChg>
+        <pc:picChg chg="add mod">
+          <ac:chgData name="Annanay Kapila" userId="333c25d8f56949d8" providerId="LiveId" clId="{40A5659F-09DE-4485-9DDA-1A4205ADF249}" dt="2020-06-21T20:45:39.634" v="5889" actId="164"/>
+          <ac:picMkLst>
+            <pc:docMk/>
+            <pc:sldMk cId="563156703" sldId="286"/>
+            <ac:picMk id="4" creationId="{01349025-8B1E-4C8F-B319-501194DE2579}"/>
+          </ac:picMkLst>
+        </pc:picChg>
+        <pc:picChg chg="add mod">
+          <ac:chgData name="Annanay Kapila" userId="333c25d8f56949d8" providerId="LiveId" clId="{40A5659F-09DE-4485-9DDA-1A4205ADF249}" dt="2020-06-21T20:45:39.634" v="5889" actId="164"/>
+          <ac:picMkLst>
+            <pc:docMk/>
+            <pc:sldMk cId="563156703" sldId="286"/>
+            <ac:picMk id="5" creationId="{DB643C7E-2953-40C2-B2F1-9C49443FC2EB}"/>
+          </ac:picMkLst>
+        </pc:picChg>
+        <pc:picChg chg="add mod">
+          <ac:chgData name="Annanay Kapila" userId="333c25d8f56949d8" providerId="LiveId" clId="{40A5659F-09DE-4485-9DDA-1A4205ADF249}" dt="2020-06-21T20:45:39.634" v="5889" actId="164"/>
+          <ac:picMkLst>
+            <pc:docMk/>
+            <pc:sldMk cId="563156703" sldId="286"/>
+            <ac:picMk id="6" creationId="{AE666EDD-C4A9-4E79-B0AE-BDE719E652CA}"/>
+          </ac:picMkLst>
+        </pc:picChg>
+        <pc:picChg chg="add mod">
+          <ac:chgData name="Annanay Kapila" userId="333c25d8f56949d8" providerId="LiveId" clId="{40A5659F-09DE-4485-9DDA-1A4205ADF249}" dt="2020-06-21T20:45:39.634" v="5889" actId="164"/>
+          <ac:picMkLst>
+            <pc:docMk/>
+            <pc:sldMk cId="563156703" sldId="286"/>
+            <ac:picMk id="7" creationId="{57E8F4DD-5BDC-4A93-9F69-8EE36BFD23E8}"/>
+          </ac:picMkLst>
+        </pc:picChg>
+      </pc:sldChg>
+      <pc:sldChg chg="addSp modSp new mod">
+        <pc:chgData name="Annanay Kapila" userId="333c25d8f56949d8" providerId="LiveId" clId="{40A5659F-09DE-4485-9DDA-1A4205ADF249}" dt="2020-06-23T16:39:46.112" v="7451" actId="20577"/>
+        <pc:sldMkLst>
+          <pc:docMk/>
+          <pc:sldMk cId="1842836331" sldId="287"/>
+        </pc:sldMkLst>
+        <pc:spChg chg="mod">
+          <ac:chgData name="Annanay Kapila" userId="333c25d8f56949d8" providerId="LiveId" clId="{40A5659F-09DE-4485-9DDA-1A4205ADF249}" dt="2020-06-20T19:05:42.362" v="5591" actId="5793"/>
+          <ac:spMkLst>
+            <pc:docMk/>
+            <pc:sldMk cId="1842836331" sldId="287"/>
+            <ac:spMk id="2" creationId="{60460397-207A-4693-821A-30DCCCD3A8CB}"/>
+          </ac:spMkLst>
+        </pc:spChg>
+        <pc:spChg chg="mod">
+          <ac:chgData name="Annanay Kapila" userId="333c25d8f56949d8" providerId="LiveId" clId="{40A5659F-09DE-4485-9DDA-1A4205ADF249}" dt="2020-06-23T16:39:46.112" v="7451" actId="20577"/>
+          <ac:spMkLst>
+            <pc:docMk/>
+            <pc:sldMk cId="1842836331" sldId="287"/>
+            <ac:spMk id="3" creationId="{392EB81F-6F33-488B-8C0D-ECCE50271FE0}"/>
+          </ac:spMkLst>
+        </pc:spChg>
+        <pc:spChg chg="add mod">
+          <ac:chgData name="Annanay Kapila" userId="333c25d8f56949d8" providerId="LiveId" clId="{40A5659F-09DE-4485-9DDA-1A4205ADF249}" dt="2020-06-23T16:27:28.597" v="7330" actId="1076"/>
+          <ac:spMkLst>
+            <pc:docMk/>
+            <pc:sldMk cId="1842836331" sldId="287"/>
+            <ac:spMk id="5" creationId="{62290C45-740A-4AA3-9F5F-E8193377C2EF}"/>
+          </ac:spMkLst>
+        </pc:spChg>
+        <pc:picChg chg="add mod">
+          <ac:chgData name="Annanay Kapila" userId="333c25d8f56949d8" providerId="LiveId" clId="{40A5659F-09DE-4485-9DDA-1A4205ADF249}" dt="2020-06-23T16:26:45.675" v="7278" actId="1076"/>
+          <ac:picMkLst>
+            <pc:docMk/>
+            <pc:sldMk cId="1842836331" sldId="287"/>
+            <ac:picMk id="4" creationId="{EE0DAD59-3DE0-49BA-AA41-20CE46247D74}"/>
+          </ac:picMkLst>
+        </pc:picChg>
+      </pc:sldChg>
+      <pc:sldChg chg="modSp new mod">
+        <pc:chgData name="Annanay Kapila" userId="333c25d8f56949d8" providerId="LiveId" clId="{40A5659F-09DE-4485-9DDA-1A4205ADF249}" dt="2020-06-23T16:40:14.776" v="7467" actId="20577"/>
+        <pc:sldMkLst>
+          <pc:docMk/>
+          <pc:sldMk cId="3944327097" sldId="288"/>
+        </pc:sldMkLst>
+        <pc:spChg chg="mod">
+          <ac:chgData name="Annanay Kapila" userId="333c25d8f56949d8" providerId="LiveId" clId="{40A5659F-09DE-4485-9DDA-1A4205ADF249}" dt="2020-06-20T19:05:58.278" v="5607" actId="20577"/>
+          <ac:spMkLst>
+            <pc:docMk/>
+            <pc:sldMk cId="3944327097" sldId="288"/>
+            <ac:spMk id="2" creationId="{00B43AD7-98CA-4B8E-B83C-2EB384227646}"/>
+          </ac:spMkLst>
+        </pc:spChg>
+        <pc:spChg chg="mod">
+          <ac:chgData name="Annanay Kapila" userId="333c25d8f56949d8" providerId="LiveId" clId="{40A5659F-09DE-4485-9DDA-1A4205ADF249}" dt="2020-06-23T16:40:14.776" v="7467" actId="20577"/>
+          <ac:spMkLst>
+            <pc:docMk/>
+            <pc:sldMk cId="3944327097" sldId="288"/>
+            <ac:spMk id="3" creationId="{62DEFA2D-ED57-4F84-8899-6D81A7CE3104}"/>
+          </ac:spMkLst>
+        </pc:spChg>
+      </pc:sldChg>
+      <pc:sldChg chg="addSp delSp modSp new mod">
+        <pc:chgData name="Annanay Kapila" userId="333c25d8f56949d8" providerId="LiveId" clId="{40A5659F-09DE-4485-9DDA-1A4205ADF249}" dt="2020-06-21T20:49:40.048" v="6060" actId="14100"/>
+        <pc:sldMkLst>
+          <pc:docMk/>
+          <pc:sldMk cId="3726362488" sldId="289"/>
+        </pc:sldMkLst>
+        <pc:spChg chg="del mod">
+          <ac:chgData name="Annanay Kapila" userId="333c25d8f56949d8" providerId="LiveId" clId="{40A5659F-09DE-4485-9DDA-1A4205ADF249}" dt="2020-06-21T20:12:44.563" v="5797" actId="478"/>
+          <ac:spMkLst>
+            <pc:docMk/>
+            <pc:sldMk cId="3726362488" sldId="289"/>
+            <ac:spMk id="2" creationId="{27FB9A1E-4EFE-4D5D-8064-85FD9B9A5381}"/>
+          </ac:spMkLst>
+        </pc:spChg>
+        <pc:spChg chg="del">
+          <ac:chgData name="Annanay Kapila" userId="333c25d8f56949d8" providerId="LiveId" clId="{40A5659F-09DE-4485-9DDA-1A4205ADF249}" dt="2020-06-21T20:04:36.244" v="5783" actId="478"/>
+          <ac:spMkLst>
+            <pc:docMk/>
+            <pc:sldMk cId="3726362488" sldId="289"/>
+            <ac:spMk id="3" creationId="{25F3D883-56A0-455B-9FEA-B853BA1498DC}"/>
+          </ac:spMkLst>
+        </pc:spChg>
+        <pc:spChg chg="add del mod">
+          <ac:chgData name="Annanay Kapila" userId="333c25d8f56949d8" providerId="LiveId" clId="{40A5659F-09DE-4485-9DDA-1A4205ADF249}" dt="2020-06-21T20:12:47.866" v="5798" actId="478"/>
+          <ac:spMkLst>
+            <pc:docMk/>
+            <pc:sldMk cId="3726362488" sldId="289"/>
+            <ac:spMk id="9" creationId="{A8D6716C-6D82-49F5-8391-80D982FEF22E}"/>
+          </ac:spMkLst>
+        </pc:spChg>
+        <pc:grpChg chg="add mod">
+          <ac:chgData name="Annanay Kapila" userId="333c25d8f56949d8" providerId="LiveId" clId="{40A5659F-09DE-4485-9DDA-1A4205ADF249}" dt="2020-06-21T20:49:40.048" v="6060" actId="14100"/>
+          <ac:grpSpMkLst>
+            <pc:docMk/>
+            <pc:sldMk cId="3726362488" sldId="289"/>
+            <ac:grpSpMk id="15" creationId="{D9045DBC-F69C-4AC9-B3A3-9E3551DB0561}"/>
+          </ac:grpSpMkLst>
+        </pc:grpChg>
+        <pc:picChg chg="add del mod">
+          <ac:chgData name="Annanay Kapila" userId="333c25d8f56949d8" providerId="LiveId" clId="{40A5659F-09DE-4485-9DDA-1A4205ADF249}" dt="2020-06-21T20:12:56.629" v="5801" actId="21"/>
+          <ac:picMkLst>
+            <pc:docMk/>
+            <pc:sldMk cId="3726362488" sldId="289"/>
+            <ac:picMk id="4" creationId="{7E80987F-F97A-4C8F-835A-EF49E7BFEFFF}"/>
+          </ac:picMkLst>
+        </pc:picChg>
+        <pc:picChg chg="add del mod">
+          <ac:chgData name="Annanay Kapila" userId="333c25d8f56949d8" providerId="LiveId" clId="{40A5659F-09DE-4485-9DDA-1A4205ADF249}" dt="2020-06-21T20:13:01.311" v="5803" actId="21"/>
+          <ac:picMkLst>
+            <pc:docMk/>
+            <pc:sldMk cId="3726362488" sldId="289"/>
+            <ac:picMk id="5" creationId="{C4A4CBF3-8B85-4CEC-BCEC-3EE794236949}"/>
+          </ac:picMkLst>
+        </pc:picChg>
+        <pc:picChg chg="add mod">
+          <ac:chgData name="Annanay Kapila" userId="333c25d8f56949d8" providerId="LiveId" clId="{40A5659F-09DE-4485-9DDA-1A4205ADF249}" dt="2020-06-21T20:49:33.142" v="6059" actId="164"/>
+          <ac:picMkLst>
+            <pc:docMk/>
+            <pc:sldMk cId="3726362488" sldId="289"/>
+            <ac:picMk id="6" creationId="{068EE881-6492-4209-BE60-64266DA1F796}"/>
+          </ac:picMkLst>
+        </pc:picChg>
+        <pc:picChg chg="add mod">
+          <ac:chgData name="Annanay Kapila" userId="333c25d8f56949d8" providerId="LiveId" clId="{40A5659F-09DE-4485-9DDA-1A4205ADF249}" dt="2020-06-21T20:49:33.142" v="6059" actId="164"/>
+          <ac:picMkLst>
+            <pc:docMk/>
+            <pc:sldMk cId="3726362488" sldId="289"/>
+            <ac:picMk id="7" creationId="{A564882B-39D7-4C38-B45D-C424FF23F4C1}"/>
+          </ac:picMkLst>
+        </pc:picChg>
+        <pc:picChg chg="add mod">
+          <ac:chgData name="Annanay Kapila" userId="333c25d8f56949d8" providerId="LiveId" clId="{40A5659F-09DE-4485-9DDA-1A4205ADF249}" dt="2020-06-21T20:49:33.142" v="6059" actId="164"/>
+          <ac:picMkLst>
+            <pc:docMk/>
+            <pc:sldMk cId="3726362488" sldId="289"/>
+            <ac:picMk id="10" creationId="{3D253616-2916-4301-881C-AEF5B78A1186}"/>
+          </ac:picMkLst>
+        </pc:picChg>
+        <pc:picChg chg="add del">
+          <ac:chgData name="Annanay Kapila" userId="333c25d8f56949d8" providerId="LiveId" clId="{40A5659F-09DE-4485-9DDA-1A4205ADF249}" dt="2020-06-21T20:16:46.053" v="5816" actId="478"/>
+          <ac:picMkLst>
+            <pc:docMk/>
+            <pc:sldMk cId="3726362488" sldId="289"/>
+            <ac:picMk id="11" creationId="{AF6C3287-EC3F-4D96-87BA-7121C7281F2C}"/>
+          </ac:picMkLst>
+        </pc:picChg>
+        <pc:picChg chg="add mod">
+          <ac:chgData name="Annanay Kapila" userId="333c25d8f56949d8" providerId="LiveId" clId="{40A5659F-09DE-4485-9DDA-1A4205ADF249}" dt="2020-06-21T20:49:33.142" v="6059" actId="164"/>
+          <ac:picMkLst>
+            <pc:docMk/>
+            <pc:sldMk cId="3726362488" sldId="289"/>
+            <ac:picMk id="12" creationId="{55BB646B-3821-467F-9F36-136628842A9E}"/>
+          </ac:picMkLst>
+        </pc:picChg>
+        <pc:picChg chg="add mod">
+          <ac:chgData name="Annanay Kapila" userId="333c25d8f56949d8" providerId="LiveId" clId="{40A5659F-09DE-4485-9DDA-1A4205ADF249}" dt="2020-06-21T20:49:33.142" v="6059" actId="164"/>
+          <ac:picMkLst>
+            <pc:docMk/>
+            <pc:sldMk cId="3726362488" sldId="289"/>
+            <ac:picMk id="13" creationId="{72AEFBB3-2944-498E-92C4-599DFE627993}"/>
+          </ac:picMkLst>
+        </pc:picChg>
+        <pc:picChg chg="add mod">
+          <ac:chgData name="Annanay Kapila" userId="333c25d8f56949d8" providerId="LiveId" clId="{40A5659F-09DE-4485-9DDA-1A4205ADF249}" dt="2020-06-21T20:49:33.142" v="6059" actId="164"/>
+          <ac:picMkLst>
+            <pc:docMk/>
+            <pc:sldMk cId="3726362488" sldId="289"/>
+            <ac:picMk id="14" creationId="{7247AEF4-8136-4CB4-9C66-C1D52BD058A1}"/>
+          </ac:picMkLst>
+        </pc:picChg>
+      </pc:sldChg>
+      <pc:sldChg chg="add del">
+        <pc:chgData name="Annanay Kapila" userId="333c25d8f56949d8" providerId="LiveId" clId="{40A5659F-09DE-4485-9DDA-1A4205ADF249}" dt="2020-06-21T20:39:02.220" v="5824"/>
+        <pc:sldMkLst>
+          <pc:docMk/>
+          <pc:sldMk cId="400447069" sldId="290"/>
+        </pc:sldMkLst>
+      </pc:sldChg>
+      <pc:sldChg chg="addSp delSp modSp new mod">
+        <pc:chgData name="Annanay Kapila" userId="333c25d8f56949d8" providerId="LiveId" clId="{40A5659F-09DE-4485-9DDA-1A4205ADF249}" dt="2020-06-23T13:11:00.228" v="6990" actId="20577"/>
+        <pc:sldMkLst>
+          <pc:docMk/>
+          <pc:sldMk cId="1346006921" sldId="290"/>
+        </pc:sldMkLst>
+        <pc:spChg chg="mod">
+          <ac:chgData name="Annanay Kapila" userId="333c25d8f56949d8" providerId="LiveId" clId="{40A5659F-09DE-4485-9DDA-1A4205ADF249}" dt="2020-06-23T12:40:57.712" v="6663" actId="1076"/>
+          <ac:spMkLst>
+            <pc:docMk/>
+            <pc:sldMk cId="1346006921" sldId="290"/>
+            <ac:spMk id="2" creationId="{32E8879B-3762-4BD9-87E0-2E2B387332B1}"/>
+          </ac:spMkLst>
+        </pc:spChg>
+        <pc:spChg chg="del mod">
+          <ac:chgData name="Annanay Kapila" userId="333c25d8f56949d8" providerId="LiveId" clId="{40A5659F-09DE-4485-9DDA-1A4205ADF249}" dt="2020-06-23T12:52:58.247" v="6675"/>
+          <ac:spMkLst>
+            <pc:docMk/>
+            <pc:sldMk cId="1346006921" sldId="290"/>
+            <ac:spMk id="3" creationId="{20351944-E80C-48C5-B6E5-1689739BDB89}"/>
+          </ac:spMkLst>
+        </pc:spChg>
+        <pc:spChg chg="add mod">
+          <ac:chgData name="Annanay Kapila" userId="333c25d8f56949d8" providerId="LiveId" clId="{40A5659F-09DE-4485-9DDA-1A4205ADF249}" dt="2020-06-23T13:07:31.371" v="6825" actId="20577"/>
+          <ac:spMkLst>
+            <pc:docMk/>
+            <pc:sldMk cId="1346006921" sldId="290"/>
+            <ac:spMk id="6" creationId="{17562532-12EE-478C-975E-68C172B24282}"/>
+          </ac:spMkLst>
+        </pc:spChg>
+        <pc:spChg chg="add mod">
+          <ac:chgData name="Annanay Kapila" userId="333c25d8f56949d8" providerId="LiveId" clId="{40A5659F-09DE-4485-9DDA-1A4205ADF249}" dt="2020-06-23T13:11:00.228" v="6990" actId="20577"/>
+          <ac:spMkLst>
+            <pc:docMk/>
+            <pc:sldMk cId="1346006921" sldId="290"/>
+            <ac:spMk id="8" creationId="{0380A268-4209-431B-8AF7-E0E7FBA6BF07}"/>
+          </ac:spMkLst>
+        </pc:spChg>
+        <pc:picChg chg="add mod">
+          <ac:chgData name="Annanay Kapila" userId="333c25d8f56949d8" providerId="LiveId" clId="{40A5659F-09DE-4485-9DDA-1A4205ADF249}" dt="2020-06-23T13:08:49.721" v="6836" actId="14100"/>
+          <ac:picMkLst>
+            <pc:docMk/>
+            <pc:sldMk cId="1346006921" sldId="290"/>
+            <ac:picMk id="4" creationId="{FB4B0418-59B3-433C-94C1-274BBAAA0F5B}"/>
+          </ac:picMkLst>
+        </pc:picChg>
+        <pc:picChg chg="add mod">
+          <ac:chgData name="Annanay Kapila" userId="333c25d8f56949d8" providerId="LiveId" clId="{40A5659F-09DE-4485-9DDA-1A4205ADF249}" dt="2020-06-23T13:10:55.607" v="6988" actId="1076"/>
+          <ac:picMkLst>
+            <pc:docMk/>
+            <pc:sldMk cId="1346006921" sldId="290"/>
+            <ac:picMk id="5" creationId="{B1DBC952-4F10-439A-A07C-600435C87542}"/>
+          </ac:picMkLst>
+        </pc:picChg>
+        <pc:picChg chg="add mod">
+          <ac:chgData name="Annanay Kapila" userId="333c25d8f56949d8" providerId="LiveId" clId="{40A5659F-09DE-4485-9DDA-1A4205ADF249}" dt="2020-06-23T13:10:06.170" v="6852" actId="1076"/>
+          <ac:picMkLst>
+            <pc:docMk/>
+            <pc:sldMk cId="1346006921" sldId="290"/>
+            <ac:picMk id="7" creationId="{3A3A922A-935C-46CE-8974-8DB18BBD088D}"/>
+          </ac:picMkLst>
+        </pc:picChg>
       </pc:sldChg>
     </pc:docChg>
   </pc:docChgLst>
@@ -1230,7 +1676,7 @@
           <a:p>
             <a:fld id="{E475EE19-9DB9-4572-8E82-4B0F1883CA9B}" type="datetimeFigureOut">
               <a:rPr lang="en-GB" smtClean="0"/>
-              <a:t>18/06/2020</a:t>
+              <a:t>23/06/2020</a:t>
             </a:fld>
             <a:endParaRPr lang="en-GB"/>
           </a:p>
@@ -1430,7 +1876,7 @@
           <a:p>
             <a:fld id="{E475EE19-9DB9-4572-8E82-4B0F1883CA9B}" type="datetimeFigureOut">
               <a:rPr lang="en-GB" smtClean="0"/>
-              <a:t>18/06/2020</a:t>
+              <a:t>23/06/2020</a:t>
             </a:fld>
             <a:endParaRPr lang="en-GB"/>
           </a:p>
@@ -1640,7 +2086,7 @@
           <a:p>
             <a:fld id="{E475EE19-9DB9-4572-8E82-4B0F1883CA9B}" type="datetimeFigureOut">
               <a:rPr lang="en-GB" smtClean="0"/>
-              <a:t>18/06/2020</a:t>
+              <a:t>23/06/2020</a:t>
             </a:fld>
             <a:endParaRPr lang="en-GB"/>
           </a:p>
@@ -1840,7 +2286,7 @@
           <a:p>
             <a:fld id="{E475EE19-9DB9-4572-8E82-4B0F1883CA9B}" type="datetimeFigureOut">
               <a:rPr lang="en-GB" smtClean="0"/>
-              <a:t>18/06/2020</a:t>
+              <a:t>23/06/2020</a:t>
             </a:fld>
             <a:endParaRPr lang="en-GB"/>
           </a:p>
@@ -2116,7 +2562,7 @@
           <a:p>
             <a:fld id="{E475EE19-9DB9-4572-8E82-4B0F1883CA9B}" type="datetimeFigureOut">
               <a:rPr lang="en-GB" smtClean="0"/>
-              <a:t>18/06/2020</a:t>
+              <a:t>23/06/2020</a:t>
             </a:fld>
             <a:endParaRPr lang="en-GB"/>
           </a:p>
@@ -2384,7 +2830,7 @@
           <a:p>
             <a:fld id="{E475EE19-9DB9-4572-8E82-4B0F1883CA9B}" type="datetimeFigureOut">
               <a:rPr lang="en-GB" smtClean="0"/>
-              <a:t>18/06/2020</a:t>
+              <a:t>23/06/2020</a:t>
             </a:fld>
             <a:endParaRPr lang="en-GB"/>
           </a:p>
@@ -2799,7 +3245,7 @@
           <a:p>
             <a:fld id="{E475EE19-9DB9-4572-8E82-4B0F1883CA9B}" type="datetimeFigureOut">
               <a:rPr lang="en-GB" smtClean="0"/>
-              <a:t>18/06/2020</a:t>
+              <a:t>23/06/2020</a:t>
             </a:fld>
             <a:endParaRPr lang="en-GB"/>
           </a:p>
@@ -2941,7 +3387,7 @@
           <a:p>
             <a:fld id="{E475EE19-9DB9-4572-8E82-4B0F1883CA9B}" type="datetimeFigureOut">
               <a:rPr lang="en-GB" smtClean="0"/>
-              <a:t>18/06/2020</a:t>
+              <a:t>23/06/2020</a:t>
             </a:fld>
             <a:endParaRPr lang="en-GB"/>
           </a:p>
@@ -3054,7 +3500,7 @@
           <a:p>
             <a:fld id="{E475EE19-9DB9-4572-8E82-4B0F1883CA9B}" type="datetimeFigureOut">
               <a:rPr lang="en-GB" smtClean="0"/>
-              <a:t>18/06/2020</a:t>
+              <a:t>23/06/2020</a:t>
             </a:fld>
             <a:endParaRPr lang="en-GB"/>
           </a:p>
@@ -3367,7 +3813,7 @@
           <a:p>
             <a:fld id="{E475EE19-9DB9-4572-8E82-4B0F1883CA9B}" type="datetimeFigureOut">
               <a:rPr lang="en-GB" smtClean="0"/>
-              <a:t>18/06/2020</a:t>
+              <a:t>23/06/2020</a:t>
             </a:fld>
             <a:endParaRPr lang="en-GB"/>
           </a:p>
@@ -3656,7 +4102,7 @@
           <a:p>
             <a:fld id="{E475EE19-9DB9-4572-8E82-4B0F1883CA9B}" type="datetimeFigureOut">
               <a:rPr lang="en-GB" smtClean="0"/>
-              <a:t>18/06/2020</a:t>
+              <a:t>23/06/2020</a:t>
             </a:fld>
             <a:endParaRPr lang="en-GB"/>
           </a:p>
@@ -3899,7 +4345,7 @@
           <a:p>
             <a:fld id="{E475EE19-9DB9-4572-8E82-4B0F1883CA9B}" type="datetimeFigureOut">
               <a:rPr lang="en-GB" smtClean="0"/>
-              <a:t>18/06/2020</a:t>
+              <a:t>23/06/2020</a:t>
             </a:fld>
             <a:endParaRPr lang="en-GB"/>
           </a:p>
@@ -7193,7 +7639,7 @@
           <p:cNvPr id="2" name="Title 1">
             <a:extLst>
               <a:ext uri="{FF2B5EF4-FFF2-40B4-BE49-F238E27FC236}">
-                <a16:creationId xmlns:a16="http://schemas.microsoft.com/office/drawing/2014/main" id="{A8B8131F-68B2-47CA-A578-BAC440340A2C}"/>
+                <a16:creationId xmlns:a16="http://schemas.microsoft.com/office/drawing/2014/main" id="{0EB91AD2-0E80-4BE5-886E-652826580461}"/>
               </a:ext>
             </a:extLst>
           </p:cNvPr>
@@ -7209,7 +7655,19 @@
           <a:bodyPr/>
           <a:lstStyle/>
           <a:p>
-            <a:endParaRPr lang="en-GB"/>
+            <a:r>
+              <a:rPr lang="en-US" dirty="0"/>
+              <a:t>Gate, Qubit and </a:t>
+            </a:r>
+            <a:r>
+              <a:rPr lang="en-US" dirty="0" err="1"/>
+              <a:t>Mmt</a:t>
+            </a:r>
+            <a:r>
+              <a:rPr lang="en-US" dirty="0"/>
+              <a:t> Errors - Theory</a:t>
+            </a:r>
+            <a:endParaRPr lang="en-GB" dirty="0"/>
           </a:p>
         </p:txBody>
       </p:sp>
@@ -7218,7 +7676,7 @@
           <p:cNvPr id="3" name="Content Placeholder 2">
             <a:extLst>
               <a:ext uri="{FF2B5EF4-FFF2-40B4-BE49-F238E27FC236}">
-                <a16:creationId xmlns:a16="http://schemas.microsoft.com/office/drawing/2014/main" id="{E3ED8E95-F065-4FC0-8E66-31032FAC5DB9}"/>
+                <a16:creationId xmlns:a16="http://schemas.microsoft.com/office/drawing/2014/main" id="{D19CA2AF-D05D-4EDA-AF6F-78C0E7E8C944}"/>
               </a:ext>
             </a:extLst>
           </p:cNvPr>
@@ -7229,19 +7687,1813 @@
             <p:ph idx="1"/>
           </p:nvPr>
         </p:nvSpPr>
-        <p:spPr/>
-        <p:txBody>
-          <a:bodyPr/>
+        <p:spPr>
+          <a:xfrm>
+            <a:off x="838200" y="1499616"/>
+            <a:ext cx="11003280" cy="4677347"/>
+          </a:xfrm>
+        </p:spPr>
+        <p:txBody>
+          <a:bodyPr>
+            <a:normAutofit/>
+          </a:bodyPr>
           <a:lstStyle/>
           <a:p>
-            <a:endParaRPr lang="en-GB"/>
+            <a:r>
+              <a:rPr lang="en-US" sz="1800" dirty="0"/>
+              <a:t>Good news - Gate and qubit errors are stored and retrievable from IBM database (not in docs!).</a:t>
+            </a:r>
+          </a:p>
+          <a:p>
+            <a:r>
+              <a:rPr lang="en-US" sz="1800" dirty="0"/>
+              <a:t>Main </a:t>
+            </a:r>
+            <a:r>
+              <a:rPr lang="en-US" sz="1800" b="1" dirty="0"/>
+              <a:t>qubit errors </a:t>
+            </a:r>
+            <a:r>
+              <a:rPr lang="en-US" sz="1800" dirty="0"/>
+              <a:t>are </a:t>
+            </a:r>
+            <a:r>
+              <a:rPr lang="en-US" sz="1800" b="1" dirty="0"/>
+              <a:t>T1 </a:t>
+            </a:r>
+            <a:r>
+              <a:rPr lang="en-US" sz="1800" dirty="0"/>
+              <a:t>(transverse relaxation/ amplitude damping) and </a:t>
+            </a:r>
+            <a:r>
+              <a:rPr lang="en-US" sz="1800" b="1" dirty="0"/>
+              <a:t>T2 </a:t>
+            </a:r>
+            <a:r>
+              <a:rPr lang="en-US" sz="1800" dirty="0"/>
+              <a:t>(dephasing or longitudinal relaxation). Both are measured and stored by IBM.</a:t>
+            </a:r>
+          </a:p>
+          <a:p>
+            <a:r>
+              <a:rPr lang="en-US" sz="1800" dirty="0"/>
+              <a:t>Main </a:t>
+            </a:r>
+            <a:r>
+              <a:rPr lang="en-US" sz="1800" b="1" dirty="0"/>
+              <a:t>gate errors </a:t>
+            </a:r>
+            <a:r>
+              <a:rPr lang="en-US" sz="1800" dirty="0"/>
+              <a:t>are </a:t>
+            </a:r>
+            <a:r>
+              <a:rPr lang="en-US" sz="1800" b="1" dirty="0"/>
+              <a:t>amplitude and angle errors </a:t>
+            </a:r>
+            <a:r>
+              <a:rPr lang="en-US" sz="1800" dirty="0"/>
+              <a:t>. IBM only stores </a:t>
+            </a:r>
+            <a:r>
+              <a:rPr lang="en-US" sz="1800" b="1" dirty="0"/>
+              <a:t>average gate infidelity</a:t>
+            </a:r>
+            <a:endParaRPr lang="en-US" sz="1800" dirty="0"/>
+          </a:p>
+          <a:p>
+            <a:endParaRPr lang="en-US" sz="1800" dirty="0"/>
+          </a:p>
+          <a:p>
+            <a:r>
+              <a:rPr lang="en-US" sz="1800" dirty="0"/>
+              <a:t>Code used to retrieve error is same as in </a:t>
+            </a:r>
+            <a:r>
+              <a:rPr lang="en-US" sz="1800" dirty="0" err="1"/>
+              <a:t>Qiskit</a:t>
+            </a:r>
+            <a:r>
+              <a:rPr lang="en-US" sz="1800" dirty="0"/>
+              <a:t>-Ignis (manually tested for some qubits, sample results coming up in the next slides).</a:t>
+            </a:r>
+          </a:p>
+          <a:p>
+            <a:r>
+              <a:rPr lang="en-US" sz="1800" dirty="0"/>
+              <a:t>Results seem to be reliable close to the time of a calibration (as expected) but can differ significantly some hours after a calibration.</a:t>
+            </a:r>
+          </a:p>
+          <a:p>
+            <a:pPr marL="0" indent="0">
+              <a:buNone/>
+            </a:pPr>
+            <a:endParaRPr lang="en-US" sz="1800" dirty="0"/>
+          </a:p>
+          <a:p>
+            <a:endParaRPr lang="en-GB" sz="1800" dirty="0"/>
           </a:p>
         </p:txBody>
       </p:sp>
     </p:spTree>
     <p:extLst>
       <p:ext uri="{BB962C8B-B14F-4D97-AF65-F5344CB8AC3E}">
-        <p14:creationId xmlns:p14="http://schemas.microsoft.com/office/powerpoint/2010/main" val="1720655337"/>
+        <p14:creationId xmlns:p14="http://schemas.microsoft.com/office/powerpoint/2010/main" val="3868363432"/>
+      </p:ext>
+    </p:extLst>
+  </p:cSld>
+  <p:clrMapOvr>
+    <a:masterClrMapping/>
+  </p:clrMapOvr>
+</p:sld>
+</file>
+
+<file path=ppt/slides/slide24.xml><?xml version="1.0" encoding="utf-8"?>
+<p:sld xmlns:a="http://schemas.openxmlformats.org/drawingml/2006/main" xmlns:r="http://schemas.openxmlformats.org/officeDocument/2006/relationships" xmlns:p="http://schemas.openxmlformats.org/presentationml/2006/main">
+  <p:cSld>
+    <p:spTree>
+      <p:nvGrpSpPr>
+        <p:cNvPr id="1" name=""/>
+        <p:cNvGrpSpPr/>
+        <p:nvPr/>
+      </p:nvGrpSpPr>
+      <p:grpSpPr>
+        <a:xfrm>
+          <a:off x="0" y="0"/>
+          <a:ext cx="0" cy="0"/>
+          <a:chOff x="0" y="0"/>
+          <a:chExt cx="0" cy="0"/>
+        </a:xfrm>
+      </p:grpSpPr>
+      <p:sp>
+        <p:nvSpPr>
+          <p:cNvPr id="2" name="Title 1">
+            <a:extLst>
+              <a:ext uri="{FF2B5EF4-FFF2-40B4-BE49-F238E27FC236}">
+                <a16:creationId xmlns:a16="http://schemas.microsoft.com/office/drawing/2014/main" id="{32E8879B-3762-4BD9-87E0-2E2B387332B1}"/>
+              </a:ext>
+            </a:extLst>
+          </p:cNvPr>
+          <p:cNvSpPr>
+            <a:spLocks noGrp="1"/>
+          </p:cNvSpPr>
+          <p:nvPr>
+            <p:ph type="title"/>
+          </p:nvPr>
+        </p:nvSpPr>
+        <p:spPr>
+          <a:xfrm>
+            <a:off x="728472" y="-130874"/>
+            <a:ext cx="10515600" cy="1325563"/>
+          </a:xfrm>
+        </p:spPr>
+        <p:txBody>
+          <a:bodyPr/>
+          <a:lstStyle/>
+          <a:p>
+            <a:r>
+              <a:rPr lang="en-US" dirty="0"/>
+              <a:t>Gate Error Metrology</a:t>
+            </a:r>
+            <a:endParaRPr lang="en-GB" dirty="0"/>
+          </a:p>
+        </p:txBody>
+      </p:sp>
+      <p:pic>
+        <p:nvPicPr>
+          <p:cNvPr id="5" name="Content Placeholder 4">
+            <a:extLst>
+              <a:ext uri="{FF2B5EF4-FFF2-40B4-BE49-F238E27FC236}">
+                <a16:creationId xmlns:a16="http://schemas.microsoft.com/office/drawing/2014/main" id="{B1DBC952-4F10-439A-A07C-600435C87542}"/>
+              </a:ext>
+            </a:extLst>
+          </p:cNvPr>
+          <p:cNvPicPr>
+            <a:picLocks noGrp="1" noChangeAspect="1"/>
+          </p:cNvPicPr>
+          <p:nvPr>
+            <p:ph idx="1"/>
+          </p:nvPr>
+        </p:nvPicPr>
+        <p:blipFill>
+          <a:blip r:embed="rId2"/>
+          <a:stretch>
+            <a:fillRect/>
+          </a:stretch>
+        </p:blipFill>
+        <p:spPr>
+          <a:xfrm>
+            <a:off x="7939027" y="5292879"/>
+            <a:ext cx="3937506" cy="1247220"/>
+          </a:xfrm>
+          <a:prstGeom prst="rect">
+            <a:avLst/>
+          </a:prstGeom>
+        </p:spPr>
+      </p:pic>
+      <p:pic>
+        <p:nvPicPr>
+          <p:cNvPr id="4" name="Picture 3">
+            <a:extLst>
+              <a:ext uri="{FF2B5EF4-FFF2-40B4-BE49-F238E27FC236}">
+                <a16:creationId xmlns:a16="http://schemas.microsoft.com/office/drawing/2014/main" id="{FB4B0418-59B3-433C-94C1-274BBAAA0F5B}"/>
+              </a:ext>
+            </a:extLst>
+          </p:cNvPr>
+          <p:cNvPicPr>
+            <a:picLocks noChangeAspect="1"/>
+          </p:cNvPicPr>
+          <p:nvPr/>
+        </p:nvPicPr>
+        <p:blipFill>
+          <a:blip r:embed="rId3"/>
+          <a:stretch>
+            <a:fillRect/>
+          </a:stretch>
+        </p:blipFill>
+        <p:spPr>
+          <a:xfrm>
+            <a:off x="1004569" y="1677407"/>
+            <a:ext cx="10404243" cy="1577857"/>
+          </a:xfrm>
+          <a:prstGeom prst="rect">
+            <a:avLst/>
+          </a:prstGeom>
+        </p:spPr>
+      </p:pic>
+      <p:sp>
+        <p:nvSpPr>
+          <p:cNvPr id="6" name="Content Placeholder 2">
+            <a:extLst>
+              <a:ext uri="{FF2B5EF4-FFF2-40B4-BE49-F238E27FC236}">
+                <a16:creationId xmlns:a16="http://schemas.microsoft.com/office/drawing/2014/main" id="{17562532-12EE-478C-975E-68C172B24282}"/>
+              </a:ext>
+            </a:extLst>
+          </p:cNvPr>
+          <p:cNvSpPr txBox="1">
+            <a:spLocks/>
+          </p:cNvSpPr>
+          <p:nvPr/>
+        </p:nvSpPr>
+        <p:spPr>
+          <a:xfrm>
+            <a:off x="728472" y="1090326"/>
+            <a:ext cx="11003280" cy="4677347"/>
+          </a:xfrm>
+          <a:prstGeom prst="rect">
+            <a:avLst/>
+          </a:prstGeom>
+        </p:spPr>
+        <p:txBody>
+          <a:bodyPr vert="horz" lIns="91440" tIns="45720" rIns="91440" bIns="45720" rtlCol="0">
+            <a:normAutofit/>
+          </a:bodyPr>
+          <a:lstStyle>
+            <a:lvl1pPr marL="228600" indent="-228600" algn="l" defTabSz="914400" rtl="0" eaLnBrk="1" latinLnBrk="0" hangingPunct="1">
+              <a:lnSpc>
+                <a:spcPct val="90000"/>
+              </a:lnSpc>
+              <a:spcBef>
+                <a:spcPts val="1000"/>
+              </a:spcBef>
+              <a:buFont typeface="Arial" panose="020B0604020202020204" pitchFamily="34" charset="0"/>
+              <a:buChar char="•"/>
+              <a:defRPr sz="2800" kern="1200">
+                <a:solidFill>
+                  <a:schemeClr val="tx1"/>
+                </a:solidFill>
+                <a:latin typeface="+mn-lt"/>
+                <a:ea typeface="+mn-ea"/>
+                <a:cs typeface="+mn-cs"/>
+              </a:defRPr>
+            </a:lvl1pPr>
+            <a:lvl2pPr marL="685800" indent="-228600" algn="l" defTabSz="914400" rtl="0" eaLnBrk="1" latinLnBrk="0" hangingPunct="1">
+              <a:lnSpc>
+                <a:spcPct val="90000"/>
+              </a:lnSpc>
+              <a:spcBef>
+                <a:spcPts val="500"/>
+              </a:spcBef>
+              <a:buFont typeface="Arial" panose="020B0604020202020204" pitchFamily="34" charset="0"/>
+              <a:buChar char="•"/>
+              <a:defRPr sz="2400" kern="1200">
+                <a:solidFill>
+                  <a:schemeClr val="tx1"/>
+                </a:solidFill>
+                <a:latin typeface="+mn-lt"/>
+                <a:ea typeface="+mn-ea"/>
+                <a:cs typeface="+mn-cs"/>
+              </a:defRPr>
+            </a:lvl2pPr>
+            <a:lvl3pPr marL="1143000" indent="-228600" algn="l" defTabSz="914400" rtl="0" eaLnBrk="1" latinLnBrk="0" hangingPunct="1">
+              <a:lnSpc>
+                <a:spcPct val="90000"/>
+              </a:lnSpc>
+              <a:spcBef>
+                <a:spcPts val="500"/>
+              </a:spcBef>
+              <a:buFont typeface="Arial" panose="020B0604020202020204" pitchFamily="34" charset="0"/>
+              <a:buChar char="•"/>
+              <a:defRPr sz="2000" kern="1200">
+                <a:solidFill>
+                  <a:schemeClr val="tx1"/>
+                </a:solidFill>
+                <a:latin typeface="+mn-lt"/>
+                <a:ea typeface="+mn-ea"/>
+                <a:cs typeface="+mn-cs"/>
+              </a:defRPr>
+            </a:lvl3pPr>
+            <a:lvl4pPr marL="1600200" indent="-228600" algn="l" defTabSz="914400" rtl="0" eaLnBrk="1" latinLnBrk="0" hangingPunct="1">
+              <a:lnSpc>
+                <a:spcPct val="90000"/>
+              </a:lnSpc>
+              <a:spcBef>
+                <a:spcPts val="500"/>
+              </a:spcBef>
+              <a:buFont typeface="Arial" panose="020B0604020202020204" pitchFamily="34" charset="0"/>
+              <a:buChar char="•"/>
+              <a:defRPr sz="1800" kern="1200">
+                <a:solidFill>
+                  <a:schemeClr val="tx1"/>
+                </a:solidFill>
+                <a:latin typeface="+mn-lt"/>
+                <a:ea typeface="+mn-ea"/>
+                <a:cs typeface="+mn-cs"/>
+              </a:defRPr>
+            </a:lvl4pPr>
+            <a:lvl5pPr marL="2057400" indent="-228600" algn="l" defTabSz="914400" rtl="0" eaLnBrk="1" latinLnBrk="0" hangingPunct="1">
+              <a:lnSpc>
+                <a:spcPct val="90000"/>
+              </a:lnSpc>
+              <a:spcBef>
+                <a:spcPts val="500"/>
+              </a:spcBef>
+              <a:buFont typeface="Arial" panose="020B0604020202020204" pitchFamily="34" charset="0"/>
+              <a:buChar char="•"/>
+              <a:defRPr sz="1800" kern="1200">
+                <a:solidFill>
+                  <a:schemeClr val="tx1"/>
+                </a:solidFill>
+                <a:latin typeface="+mn-lt"/>
+                <a:ea typeface="+mn-ea"/>
+                <a:cs typeface="+mn-cs"/>
+              </a:defRPr>
+            </a:lvl5pPr>
+            <a:lvl6pPr marL="2514600" indent="-228600" algn="l" defTabSz="914400" rtl="0" eaLnBrk="1" latinLnBrk="0" hangingPunct="1">
+              <a:lnSpc>
+                <a:spcPct val="90000"/>
+              </a:lnSpc>
+              <a:spcBef>
+                <a:spcPts val="500"/>
+              </a:spcBef>
+              <a:buFont typeface="Arial" panose="020B0604020202020204" pitchFamily="34" charset="0"/>
+              <a:buChar char="•"/>
+              <a:defRPr sz="1800" kern="1200">
+                <a:solidFill>
+                  <a:schemeClr val="tx1"/>
+                </a:solidFill>
+                <a:latin typeface="+mn-lt"/>
+                <a:ea typeface="+mn-ea"/>
+                <a:cs typeface="+mn-cs"/>
+              </a:defRPr>
+            </a:lvl6pPr>
+            <a:lvl7pPr marL="2971800" indent="-228600" algn="l" defTabSz="914400" rtl="0" eaLnBrk="1" latinLnBrk="0" hangingPunct="1">
+              <a:lnSpc>
+                <a:spcPct val="90000"/>
+              </a:lnSpc>
+              <a:spcBef>
+                <a:spcPts val="500"/>
+              </a:spcBef>
+              <a:buFont typeface="Arial" panose="020B0604020202020204" pitchFamily="34" charset="0"/>
+              <a:buChar char="•"/>
+              <a:defRPr sz="1800" kern="1200">
+                <a:solidFill>
+                  <a:schemeClr val="tx1"/>
+                </a:solidFill>
+                <a:latin typeface="+mn-lt"/>
+                <a:ea typeface="+mn-ea"/>
+                <a:cs typeface="+mn-cs"/>
+              </a:defRPr>
+            </a:lvl7pPr>
+            <a:lvl8pPr marL="3429000" indent="-228600" algn="l" defTabSz="914400" rtl="0" eaLnBrk="1" latinLnBrk="0" hangingPunct="1">
+              <a:lnSpc>
+                <a:spcPct val="90000"/>
+              </a:lnSpc>
+              <a:spcBef>
+                <a:spcPts val="500"/>
+              </a:spcBef>
+              <a:buFont typeface="Arial" panose="020B0604020202020204" pitchFamily="34" charset="0"/>
+              <a:buChar char="•"/>
+              <a:defRPr sz="1800" kern="1200">
+                <a:solidFill>
+                  <a:schemeClr val="tx1"/>
+                </a:solidFill>
+                <a:latin typeface="+mn-lt"/>
+                <a:ea typeface="+mn-ea"/>
+                <a:cs typeface="+mn-cs"/>
+              </a:defRPr>
+            </a:lvl8pPr>
+            <a:lvl9pPr marL="3886200" indent="-228600" algn="l" defTabSz="914400" rtl="0" eaLnBrk="1" latinLnBrk="0" hangingPunct="1">
+              <a:lnSpc>
+                <a:spcPct val="90000"/>
+              </a:lnSpc>
+              <a:spcBef>
+                <a:spcPts val="500"/>
+              </a:spcBef>
+              <a:buFont typeface="Arial" panose="020B0604020202020204" pitchFamily="34" charset="0"/>
+              <a:buChar char="•"/>
+              <a:defRPr sz="1800" kern="1200">
+                <a:solidFill>
+                  <a:schemeClr val="tx1"/>
+                </a:solidFill>
+                <a:latin typeface="+mn-lt"/>
+                <a:ea typeface="+mn-ea"/>
+                <a:cs typeface="+mn-cs"/>
+              </a:defRPr>
+            </a:lvl9pPr>
+          </a:lstStyle>
+          <a:p>
+            <a:r>
+              <a:rPr lang="en-US" sz="1800" dirty="0"/>
+              <a:t>From ‘Gate Errors’, an open-source community notebook on </a:t>
+            </a:r>
+            <a:r>
+              <a:rPr lang="en-US" sz="1800" dirty="0" err="1"/>
+              <a:t>Qiskit</a:t>
+            </a:r>
+            <a:r>
+              <a:rPr lang="en-US" sz="1800" dirty="0"/>
+              <a:t> </a:t>
+            </a:r>
+            <a:r>
+              <a:rPr lang="en-US" sz="1800" dirty="0" err="1"/>
+              <a:t>Github</a:t>
+            </a:r>
+            <a:r>
+              <a:rPr lang="en-US" sz="1800" dirty="0"/>
+              <a:t>, by David McKay (IBM).</a:t>
+            </a:r>
+            <a:endParaRPr lang="en-GB" sz="1800" dirty="0"/>
+          </a:p>
+        </p:txBody>
+      </p:sp>
+      <p:pic>
+        <p:nvPicPr>
+          <p:cNvPr id="7" name="Picture 6">
+            <a:extLst>
+              <a:ext uri="{FF2B5EF4-FFF2-40B4-BE49-F238E27FC236}">
+                <a16:creationId xmlns:a16="http://schemas.microsoft.com/office/drawing/2014/main" id="{3A3A922A-935C-46CE-8974-8DB18BBD088D}"/>
+              </a:ext>
+            </a:extLst>
+          </p:cNvPr>
+          <p:cNvPicPr>
+            <a:picLocks noChangeAspect="1"/>
+          </p:cNvPicPr>
+          <p:nvPr/>
+        </p:nvPicPr>
+        <p:blipFill>
+          <a:blip r:embed="rId4"/>
+          <a:stretch>
+            <a:fillRect/>
+          </a:stretch>
+        </p:blipFill>
+        <p:spPr>
+          <a:xfrm>
+            <a:off x="1138047" y="3264225"/>
+            <a:ext cx="9696450" cy="1828800"/>
+          </a:xfrm>
+          <a:prstGeom prst="rect">
+            <a:avLst/>
+          </a:prstGeom>
+        </p:spPr>
+      </p:pic>
+      <p:sp>
+        <p:nvSpPr>
+          <p:cNvPr id="8" name="Content Placeholder 2">
+            <a:extLst>
+              <a:ext uri="{FF2B5EF4-FFF2-40B4-BE49-F238E27FC236}">
+                <a16:creationId xmlns:a16="http://schemas.microsoft.com/office/drawing/2014/main" id="{0380A268-4209-431B-8AF7-E0E7FBA6BF07}"/>
+              </a:ext>
+            </a:extLst>
+          </p:cNvPr>
+          <p:cNvSpPr txBox="1">
+            <a:spLocks/>
+          </p:cNvSpPr>
+          <p:nvPr/>
+        </p:nvSpPr>
+        <p:spPr>
+          <a:xfrm>
+            <a:off x="2773427" y="5543822"/>
+            <a:ext cx="5165600" cy="706569"/>
+          </a:xfrm>
+          <a:prstGeom prst="rect">
+            <a:avLst/>
+          </a:prstGeom>
+        </p:spPr>
+        <p:txBody>
+          <a:bodyPr vert="horz" lIns="91440" tIns="45720" rIns="91440" bIns="45720" rtlCol="0">
+            <a:normAutofit/>
+          </a:bodyPr>
+          <a:lstStyle>
+            <a:lvl1pPr marL="228600" indent="-228600" algn="l" defTabSz="914400" rtl="0" eaLnBrk="1" latinLnBrk="0" hangingPunct="1">
+              <a:lnSpc>
+                <a:spcPct val="90000"/>
+              </a:lnSpc>
+              <a:spcBef>
+                <a:spcPts val="1000"/>
+              </a:spcBef>
+              <a:buFont typeface="Arial" panose="020B0604020202020204" pitchFamily="34" charset="0"/>
+              <a:buChar char="•"/>
+              <a:defRPr sz="2800" kern="1200">
+                <a:solidFill>
+                  <a:schemeClr val="tx1"/>
+                </a:solidFill>
+                <a:latin typeface="+mn-lt"/>
+                <a:ea typeface="+mn-ea"/>
+                <a:cs typeface="+mn-cs"/>
+              </a:defRPr>
+            </a:lvl1pPr>
+            <a:lvl2pPr marL="685800" indent="-228600" algn="l" defTabSz="914400" rtl="0" eaLnBrk="1" latinLnBrk="0" hangingPunct="1">
+              <a:lnSpc>
+                <a:spcPct val="90000"/>
+              </a:lnSpc>
+              <a:spcBef>
+                <a:spcPts val="500"/>
+              </a:spcBef>
+              <a:buFont typeface="Arial" panose="020B0604020202020204" pitchFamily="34" charset="0"/>
+              <a:buChar char="•"/>
+              <a:defRPr sz="2400" kern="1200">
+                <a:solidFill>
+                  <a:schemeClr val="tx1"/>
+                </a:solidFill>
+                <a:latin typeface="+mn-lt"/>
+                <a:ea typeface="+mn-ea"/>
+                <a:cs typeface="+mn-cs"/>
+              </a:defRPr>
+            </a:lvl2pPr>
+            <a:lvl3pPr marL="1143000" indent="-228600" algn="l" defTabSz="914400" rtl="0" eaLnBrk="1" latinLnBrk="0" hangingPunct="1">
+              <a:lnSpc>
+                <a:spcPct val="90000"/>
+              </a:lnSpc>
+              <a:spcBef>
+                <a:spcPts val="500"/>
+              </a:spcBef>
+              <a:buFont typeface="Arial" panose="020B0604020202020204" pitchFamily="34" charset="0"/>
+              <a:buChar char="•"/>
+              <a:defRPr sz="2000" kern="1200">
+                <a:solidFill>
+                  <a:schemeClr val="tx1"/>
+                </a:solidFill>
+                <a:latin typeface="+mn-lt"/>
+                <a:ea typeface="+mn-ea"/>
+                <a:cs typeface="+mn-cs"/>
+              </a:defRPr>
+            </a:lvl3pPr>
+            <a:lvl4pPr marL="1600200" indent="-228600" algn="l" defTabSz="914400" rtl="0" eaLnBrk="1" latinLnBrk="0" hangingPunct="1">
+              <a:lnSpc>
+                <a:spcPct val="90000"/>
+              </a:lnSpc>
+              <a:spcBef>
+                <a:spcPts val="500"/>
+              </a:spcBef>
+              <a:buFont typeface="Arial" panose="020B0604020202020204" pitchFamily="34" charset="0"/>
+              <a:buChar char="•"/>
+              <a:defRPr sz="1800" kern="1200">
+                <a:solidFill>
+                  <a:schemeClr val="tx1"/>
+                </a:solidFill>
+                <a:latin typeface="+mn-lt"/>
+                <a:ea typeface="+mn-ea"/>
+                <a:cs typeface="+mn-cs"/>
+              </a:defRPr>
+            </a:lvl4pPr>
+            <a:lvl5pPr marL="2057400" indent="-228600" algn="l" defTabSz="914400" rtl="0" eaLnBrk="1" latinLnBrk="0" hangingPunct="1">
+              <a:lnSpc>
+                <a:spcPct val="90000"/>
+              </a:lnSpc>
+              <a:spcBef>
+                <a:spcPts val="500"/>
+              </a:spcBef>
+              <a:buFont typeface="Arial" panose="020B0604020202020204" pitchFamily="34" charset="0"/>
+              <a:buChar char="•"/>
+              <a:defRPr sz="1800" kern="1200">
+                <a:solidFill>
+                  <a:schemeClr val="tx1"/>
+                </a:solidFill>
+                <a:latin typeface="+mn-lt"/>
+                <a:ea typeface="+mn-ea"/>
+                <a:cs typeface="+mn-cs"/>
+              </a:defRPr>
+            </a:lvl5pPr>
+            <a:lvl6pPr marL="2514600" indent="-228600" algn="l" defTabSz="914400" rtl="0" eaLnBrk="1" latinLnBrk="0" hangingPunct="1">
+              <a:lnSpc>
+                <a:spcPct val="90000"/>
+              </a:lnSpc>
+              <a:spcBef>
+                <a:spcPts val="500"/>
+              </a:spcBef>
+              <a:buFont typeface="Arial" panose="020B0604020202020204" pitchFamily="34" charset="0"/>
+              <a:buChar char="•"/>
+              <a:defRPr sz="1800" kern="1200">
+                <a:solidFill>
+                  <a:schemeClr val="tx1"/>
+                </a:solidFill>
+                <a:latin typeface="+mn-lt"/>
+                <a:ea typeface="+mn-ea"/>
+                <a:cs typeface="+mn-cs"/>
+              </a:defRPr>
+            </a:lvl6pPr>
+            <a:lvl7pPr marL="2971800" indent="-228600" algn="l" defTabSz="914400" rtl="0" eaLnBrk="1" latinLnBrk="0" hangingPunct="1">
+              <a:lnSpc>
+                <a:spcPct val="90000"/>
+              </a:lnSpc>
+              <a:spcBef>
+                <a:spcPts val="500"/>
+              </a:spcBef>
+              <a:buFont typeface="Arial" panose="020B0604020202020204" pitchFamily="34" charset="0"/>
+              <a:buChar char="•"/>
+              <a:defRPr sz="1800" kern="1200">
+                <a:solidFill>
+                  <a:schemeClr val="tx1"/>
+                </a:solidFill>
+                <a:latin typeface="+mn-lt"/>
+                <a:ea typeface="+mn-ea"/>
+                <a:cs typeface="+mn-cs"/>
+              </a:defRPr>
+            </a:lvl7pPr>
+            <a:lvl8pPr marL="3429000" indent="-228600" algn="l" defTabSz="914400" rtl="0" eaLnBrk="1" latinLnBrk="0" hangingPunct="1">
+              <a:lnSpc>
+                <a:spcPct val="90000"/>
+              </a:lnSpc>
+              <a:spcBef>
+                <a:spcPts val="500"/>
+              </a:spcBef>
+              <a:buFont typeface="Arial" panose="020B0604020202020204" pitchFamily="34" charset="0"/>
+              <a:buChar char="•"/>
+              <a:defRPr sz="1800" kern="1200">
+                <a:solidFill>
+                  <a:schemeClr val="tx1"/>
+                </a:solidFill>
+                <a:latin typeface="+mn-lt"/>
+                <a:ea typeface="+mn-ea"/>
+                <a:cs typeface="+mn-cs"/>
+              </a:defRPr>
+            </a:lvl8pPr>
+            <a:lvl9pPr marL="3886200" indent="-228600" algn="l" defTabSz="914400" rtl="0" eaLnBrk="1" latinLnBrk="0" hangingPunct="1">
+              <a:lnSpc>
+                <a:spcPct val="90000"/>
+              </a:lnSpc>
+              <a:spcBef>
+                <a:spcPts val="500"/>
+              </a:spcBef>
+              <a:buFont typeface="Arial" panose="020B0604020202020204" pitchFamily="34" charset="0"/>
+              <a:buChar char="•"/>
+              <a:defRPr sz="1800" kern="1200">
+                <a:solidFill>
+                  <a:schemeClr val="tx1"/>
+                </a:solidFill>
+                <a:latin typeface="+mn-lt"/>
+                <a:ea typeface="+mn-ea"/>
+                <a:cs typeface="+mn-cs"/>
+              </a:defRPr>
+            </a:lvl9pPr>
+          </a:lstStyle>
+          <a:p>
+            <a:r>
+              <a:rPr lang="en-US" sz="1800" dirty="0"/>
+              <a:t>IBM store a more practical notion of gate error given by average gate infidelity , where fidelity is:</a:t>
+            </a:r>
+            <a:endParaRPr lang="en-GB" sz="1800" dirty="0"/>
+          </a:p>
+        </p:txBody>
+      </p:sp>
+    </p:spTree>
+    <p:extLst>
+      <p:ext uri="{BB962C8B-B14F-4D97-AF65-F5344CB8AC3E}">
+        <p14:creationId xmlns:p14="http://schemas.microsoft.com/office/powerpoint/2010/main" val="1346006921"/>
+      </p:ext>
+    </p:extLst>
+  </p:cSld>
+  <p:clrMapOvr>
+    <a:masterClrMapping/>
+  </p:clrMapOvr>
+</p:sld>
+</file>
+
+<file path=ppt/slides/slide25.xml><?xml version="1.0" encoding="utf-8"?>
+<p:sld xmlns:a="http://schemas.openxmlformats.org/drawingml/2006/main" xmlns:r="http://schemas.openxmlformats.org/officeDocument/2006/relationships" xmlns:p="http://schemas.openxmlformats.org/presentationml/2006/main">
+  <p:cSld>
+    <p:spTree>
+      <p:nvGrpSpPr>
+        <p:cNvPr id="1" name=""/>
+        <p:cNvGrpSpPr/>
+        <p:nvPr/>
+      </p:nvGrpSpPr>
+      <p:grpSpPr>
+        <a:xfrm>
+          <a:off x="0" y="0"/>
+          <a:ext cx="0" cy="0"/>
+          <a:chOff x="0" y="0"/>
+          <a:chExt cx="0" cy="0"/>
+        </a:xfrm>
+      </p:grpSpPr>
+      <p:grpSp>
+        <p:nvGrpSpPr>
+          <p:cNvPr id="11" name="Group 10">
+            <a:extLst>
+              <a:ext uri="{FF2B5EF4-FFF2-40B4-BE49-F238E27FC236}">
+                <a16:creationId xmlns:a16="http://schemas.microsoft.com/office/drawing/2014/main" id="{D6EF708E-43A0-446A-A373-965546A2E447}"/>
+              </a:ext>
+            </a:extLst>
+          </p:cNvPr>
+          <p:cNvGrpSpPr/>
+          <p:nvPr/>
+        </p:nvGrpSpPr>
+        <p:grpSpPr>
+          <a:xfrm>
+            <a:off x="1422400" y="1280313"/>
+            <a:ext cx="8897257" cy="5577687"/>
+            <a:chOff x="1422400" y="1280313"/>
+            <a:chExt cx="9680645" cy="6319860"/>
+          </a:xfrm>
+        </p:grpSpPr>
+        <p:pic>
+          <p:nvPicPr>
+            <p:cNvPr id="8" name="Picture 7">
+              <a:extLst>
+                <a:ext uri="{FF2B5EF4-FFF2-40B4-BE49-F238E27FC236}">
+                  <a16:creationId xmlns:a16="http://schemas.microsoft.com/office/drawing/2014/main" id="{BD88E926-8D08-499D-922E-CE7B94B48F31}"/>
+                </a:ext>
+              </a:extLst>
+            </p:cNvPr>
+            <p:cNvPicPr>
+              <a:picLocks noChangeAspect="1"/>
+            </p:cNvPicPr>
+            <p:nvPr/>
+          </p:nvPicPr>
+          <p:blipFill>
+            <a:blip r:embed="rId2"/>
+            <a:stretch>
+              <a:fillRect/>
+            </a:stretch>
+          </p:blipFill>
+          <p:spPr>
+            <a:xfrm>
+              <a:off x="1422400" y="1280313"/>
+              <a:ext cx="9680644" cy="2148687"/>
+            </a:xfrm>
+            <a:prstGeom prst="rect">
+              <a:avLst/>
+            </a:prstGeom>
+          </p:spPr>
+        </p:pic>
+        <p:pic>
+          <p:nvPicPr>
+            <p:cNvPr id="9" name="Picture 8">
+              <a:extLst>
+                <a:ext uri="{FF2B5EF4-FFF2-40B4-BE49-F238E27FC236}">
+                  <a16:creationId xmlns:a16="http://schemas.microsoft.com/office/drawing/2014/main" id="{866DA005-25B2-49C8-9C8C-DF9770D5191F}"/>
+                </a:ext>
+              </a:extLst>
+            </p:cNvPr>
+            <p:cNvPicPr>
+              <a:picLocks noChangeAspect="1"/>
+            </p:cNvPicPr>
+            <p:nvPr/>
+          </p:nvPicPr>
+          <p:blipFill>
+            <a:blip r:embed="rId3"/>
+            <a:stretch>
+              <a:fillRect/>
+            </a:stretch>
+          </p:blipFill>
+          <p:spPr>
+            <a:xfrm>
+              <a:off x="1494973" y="3429000"/>
+              <a:ext cx="9559540" cy="2064843"/>
+            </a:xfrm>
+            <a:prstGeom prst="rect">
+              <a:avLst/>
+            </a:prstGeom>
+          </p:spPr>
+        </p:pic>
+        <p:pic>
+          <p:nvPicPr>
+            <p:cNvPr id="10" name="Picture 9">
+              <a:extLst>
+                <a:ext uri="{FF2B5EF4-FFF2-40B4-BE49-F238E27FC236}">
+                  <a16:creationId xmlns:a16="http://schemas.microsoft.com/office/drawing/2014/main" id="{4924470D-621D-4B55-9F0C-6CFA51DECC55}"/>
+                </a:ext>
+              </a:extLst>
+            </p:cNvPr>
+            <p:cNvPicPr>
+              <a:picLocks noChangeAspect="1"/>
+            </p:cNvPicPr>
+            <p:nvPr/>
+          </p:nvPicPr>
+          <p:blipFill>
+            <a:blip r:embed="rId4"/>
+            <a:stretch>
+              <a:fillRect/>
+            </a:stretch>
+          </p:blipFill>
+          <p:spPr>
+            <a:xfrm>
+              <a:off x="1494973" y="5451486"/>
+              <a:ext cx="9608072" cy="2148687"/>
+            </a:xfrm>
+            <a:prstGeom prst="rect">
+              <a:avLst/>
+            </a:prstGeom>
+          </p:spPr>
+        </p:pic>
+      </p:grpSp>
+      <p:sp>
+        <p:nvSpPr>
+          <p:cNvPr id="2" name="Title 1">
+            <a:extLst>
+              <a:ext uri="{FF2B5EF4-FFF2-40B4-BE49-F238E27FC236}">
+                <a16:creationId xmlns:a16="http://schemas.microsoft.com/office/drawing/2014/main" id="{07C57F7F-85AE-4014-B74C-A87F2EC2AC22}"/>
+              </a:ext>
+            </a:extLst>
+          </p:cNvPr>
+          <p:cNvSpPr>
+            <a:spLocks noGrp="1"/>
+          </p:cNvSpPr>
+          <p:nvPr>
+            <p:ph type="title"/>
+          </p:nvPr>
+        </p:nvSpPr>
+        <p:spPr>
+          <a:xfrm>
+            <a:off x="847725" y="80951"/>
+            <a:ext cx="10515600" cy="1325563"/>
+          </a:xfrm>
+        </p:spPr>
+        <p:txBody>
+          <a:bodyPr/>
+          <a:lstStyle/>
+          <a:p>
+            <a:r>
+              <a:rPr lang="en-US" dirty="0"/>
+              <a:t>Calibration Schedules - Qubits</a:t>
+            </a:r>
+            <a:endParaRPr lang="en-GB" dirty="0"/>
+          </a:p>
+        </p:txBody>
+      </p:sp>
+      <p:sp>
+        <p:nvSpPr>
+          <p:cNvPr id="3" name="Content Placeholder 2">
+            <a:extLst>
+              <a:ext uri="{FF2B5EF4-FFF2-40B4-BE49-F238E27FC236}">
+                <a16:creationId xmlns:a16="http://schemas.microsoft.com/office/drawing/2014/main" id="{8BF31A83-2F00-4880-A8BB-2D8D8D55F460}"/>
+              </a:ext>
+            </a:extLst>
+          </p:cNvPr>
+          <p:cNvSpPr>
+            <a:spLocks noGrp="1"/>
+          </p:cNvSpPr>
+          <p:nvPr>
+            <p:ph idx="1"/>
+          </p:nvPr>
+        </p:nvSpPr>
+        <p:spPr>
+          <a:xfrm>
+            <a:off x="828675" y="1048807"/>
+            <a:ext cx="10515600" cy="4351338"/>
+          </a:xfrm>
+        </p:spPr>
+        <p:txBody>
+          <a:bodyPr>
+            <a:normAutofit/>
+          </a:bodyPr>
+          <a:lstStyle/>
+          <a:p>
+            <a:r>
+              <a:rPr lang="en-US" sz="1600" dirty="0"/>
+              <a:t>Trawled IBM database to determine when certain Qubit properties are updated over last month; results here are for ibmqx2 (vertical axis is qubit no.)</a:t>
+            </a:r>
+            <a:endParaRPr lang="en-GB" sz="1600" dirty="0"/>
+          </a:p>
+        </p:txBody>
+      </p:sp>
+    </p:spTree>
+    <p:extLst>
+      <p:ext uri="{BB962C8B-B14F-4D97-AF65-F5344CB8AC3E}">
+        <p14:creationId xmlns:p14="http://schemas.microsoft.com/office/powerpoint/2010/main" val="1358112946"/>
+      </p:ext>
+    </p:extLst>
+  </p:cSld>
+  <p:clrMapOvr>
+    <a:masterClrMapping/>
+  </p:clrMapOvr>
+</p:sld>
+</file>
+
+<file path=ppt/slides/slide26.xml><?xml version="1.0" encoding="utf-8"?>
+<p:sld xmlns:a="http://schemas.openxmlformats.org/drawingml/2006/main" xmlns:r="http://schemas.openxmlformats.org/officeDocument/2006/relationships" xmlns:p="http://schemas.openxmlformats.org/presentationml/2006/main">
+  <p:cSld>
+    <p:spTree>
+      <p:nvGrpSpPr>
+        <p:cNvPr id="1" name=""/>
+        <p:cNvGrpSpPr/>
+        <p:nvPr/>
+      </p:nvGrpSpPr>
+      <p:grpSpPr>
+        <a:xfrm>
+          <a:off x="0" y="0"/>
+          <a:ext cx="0" cy="0"/>
+          <a:chOff x="0" y="0"/>
+          <a:chExt cx="0" cy="0"/>
+        </a:xfrm>
+      </p:grpSpPr>
+      <p:grpSp>
+        <p:nvGrpSpPr>
+          <p:cNvPr id="8" name="Group 7">
+            <a:extLst>
+              <a:ext uri="{FF2B5EF4-FFF2-40B4-BE49-F238E27FC236}">
+                <a16:creationId xmlns:a16="http://schemas.microsoft.com/office/drawing/2014/main" id="{D9D1A7F0-3C24-4F22-9C7A-8BD8D23B7ECD}"/>
+              </a:ext>
+            </a:extLst>
+          </p:cNvPr>
+          <p:cNvGrpSpPr/>
+          <p:nvPr/>
+        </p:nvGrpSpPr>
+        <p:grpSpPr>
+          <a:xfrm>
+            <a:off x="164851" y="1325563"/>
+            <a:ext cx="11862297" cy="4984119"/>
+            <a:chOff x="367803" y="1295685"/>
+            <a:chExt cx="11862297" cy="3850160"/>
+          </a:xfrm>
+        </p:grpSpPr>
+        <p:pic>
+          <p:nvPicPr>
+            <p:cNvPr id="4" name="Picture 3">
+              <a:extLst>
+                <a:ext uri="{FF2B5EF4-FFF2-40B4-BE49-F238E27FC236}">
+                  <a16:creationId xmlns:a16="http://schemas.microsoft.com/office/drawing/2014/main" id="{01349025-8B1E-4C8F-B319-501194DE2579}"/>
+                </a:ext>
+              </a:extLst>
+            </p:cNvPr>
+            <p:cNvPicPr>
+              <a:picLocks noChangeAspect="1"/>
+            </p:cNvPicPr>
+            <p:nvPr/>
+          </p:nvPicPr>
+          <p:blipFill>
+            <a:blip r:embed="rId2"/>
+            <a:stretch>
+              <a:fillRect/>
+            </a:stretch>
+          </p:blipFill>
+          <p:spPr>
+            <a:xfrm>
+              <a:off x="367803" y="1303173"/>
+              <a:ext cx="5728195" cy="1878182"/>
+            </a:xfrm>
+            <a:prstGeom prst="rect">
+              <a:avLst/>
+            </a:prstGeom>
+          </p:spPr>
+        </p:pic>
+        <p:pic>
+          <p:nvPicPr>
+            <p:cNvPr id="5" name="Picture 4">
+              <a:extLst>
+                <a:ext uri="{FF2B5EF4-FFF2-40B4-BE49-F238E27FC236}">
+                  <a16:creationId xmlns:a16="http://schemas.microsoft.com/office/drawing/2014/main" id="{DB643C7E-2953-40C2-B2F1-9C49443FC2EB}"/>
+                </a:ext>
+              </a:extLst>
+            </p:cNvPr>
+            <p:cNvPicPr>
+              <a:picLocks noChangeAspect="1"/>
+            </p:cNvPicPr>
+            <p:nvPr/>
+          </p:nvPicPr>
+          <p:blipFill>
+            <a:blip r:embed="rId3"/>
+            <a:stretch>
+              <a:fillRect/>
+            </a:stretch>
+          </p:blipFill>
+          <p:spPr>
+            <a:xfrm>
+              <a:off x="367803" y="3200400"/>
+              <a:ext cx="5751733" cy="1945445"/>
+            </a:xfrm>
+            <a:prstGeom prst="rect">
+              <a:avLst/>
+            </a:prstGeom>
+          </p:spPr>
+        </p:pic>
+        <p:pic>
+          <p:nvPicPr>
+            <p:cNvPr id="6" name="Picture 5">
+              <a:extLst>
+                <a:ext uri="{FF2B5EF4-FFF2-40B4-BE49-F238E27FC236}">
+                  <a16:creationId xmlns:a16="http://schemas.microsoft.com/office/drawing/2014/main" id="{AE666EDD-C4A9-4E79-B0AE-BDE719E652CA}"/>
+                </a:ext>
+              </a:extLst>
+            </p:cNvPr>
+            <p:cNvPicPr>
+              <a:picLocks noChangeAspect="1"/>
+            </p:cNvPicPr>
+            <p:nvPr/>
+          </p:nvPicPr>
+          <p:blipFill>
+            <a:blip r:embed="rId4"/>
+            <a:stretch>
+              <a:fillRect/>
+            </a:stretch>
+          </p:blipFill>
+          <p:spPr>
+            <a:xfrm>
+              <a:off x="6157636" y="1295685"/>
+              <a:ext cx="6034364" cy="1978659"/>
+            </a:xfrm>
+            <a:prstGeom prst="rect">
+              <a:avLst/>
+            </a:prstGeom>
+          </p:spPr>
+        </p:pic>
+        <p:pic>
+          <p:nvPicPr>
+            <p:cNvPr id="7" name="Picture 6">
+              <a:extLst>
+                <a:ext uri="{FF2B5EF4-FFF2-40B4-BE49-F238E27FC236}">
+                  <a16:creationId xmlns:a16="http://schemas.microsoft.com/office/drawing/2014/main" id="{57E8F4DD-5BDC-4A93-9F69-8EE36BFD23E8}"/>
+                </a:ext>
+              </a:extLst>
+            </p:cNvPr>
+            <p:cNvPicPr>
+              <a:picLocks noChangeAspect="1"/>
+            </p:cNvPicPr>
+            <p:nvPr/>
+          </p:nvPicPr>
+          <p:blipFill>
+            <a:blip r:embed="rId5"/>
+            <a:stretch>
+              <a:fillRect/>
+            </a:stretch>
+          </p:blipFill>
+          <p:spPr>
+            <a:xfrm>
+              <a:off x="6144457" y="3219454"/>
+              <a:ext cx="6085643" cy="1926391"/>
+            </a:xfrm>
+            <a:prstGeom prst="rect">
+              <a:avLst/>
+            </a:prstGeom>
+          </p:spPr>
+        </p:pic>
+      </p:grpSp>
+      <p:sp>
+        <p:nvSpPr>
+          <p:cNvPr id="2" name="Title 1">
+            <a:extLst>
+              <a:ext uri="{FF2B5EF4-FFF2-40B4-BE49-F238E27FC236}">
+                <a16:creationId xmlns:a16="http://schemas.microsoft.com/office/drawing/2014/main" id="{F2F0EE85-C29B-4646-9F04-0C9E48D7E666}"/>
+              </a:ext>
+            </a:extLst>
+          </p:cNvPr>
+          <p:cNvSpPr>
+            <a:spLocks noGrp="1"/>
+          </p:cNvSpPr>
+          <p:nvPr>
+            <p:ph type="title"/>
+          </p:nvPr>
+        </p:nvSpPr>
+        <p:spPr>
+          <a:xfrm>
+            <a:off x="838200" y="0"/>
+            <a:ext cx="10515600" cy="1325563"/>
+          </a:xfrm>
+        </p:spPr>
+        <p:txBody>
+          <a:bodyPr/>
+          <a:lstStyle/>
+          <a:p>
+            <a:r>
+              <a:rPr lang="en-US" dirty="0"/>
+              <a:t>Calibration Schedules – Gates (I)</a:t>
+            </a:r>
+            <a:endParaRPr lang="en-GB" dirty="0"/>
+          </a:p>
+        </p:txBody>
+      </p:sp>
+      <p:sp>
+        <p:nvSpPr>
+          <p:cNvPr id="3" name="Content Placeholder 2">
+            <a:extLst>
+              <a:ext uri="{FF2B5EF4-FFF2-40B4-BE49-F238E27FC236}">
+                <a16:creationId xmlns:a16="http://schemas.microsoft.com/office/drawing/2014/main" id="{FB5E14B9-118D-4B4F-9DDD-21DFE7AA73D2}"/>
+              </a:ext>
+            </a:extLst>
+          </p:cNvPr>
+          <p:cNvSpPr>
+            <a:spLocks noGrp="1"/>
+          </p:cNvSpPr>
+          <p:nvPr>
+            <p:ph idx="1"/>
+          </p:nvPr>
+        </p:nvSpPr>
+        <p:spPr>
+          <a:xfrm>
+            <a:off x="838200" y="964233"/>
+            <a:ext cx="10515600" cy="4351338"/>
+          </a:xfrm>
+        </p:spPr>
+        <p:txBody>
+          <a:bodyPr>
+            <a:normAutofit/>
+          </a:bodyPr>
+          <a:lstStyle/>
+          <a:p>
+            <a:r>
+              <a:rPr lang="en-US" sz="1600" dirty="0"/>
+              <a:t>Same but for gates on each qubit. Subtle time differences between all readings (difference of up to O(10 minutes)).</a:t>
+            </a:r>
+            <a:endParaRPr lang="en-GB" sz="1600" dirty="0"/>
+          </a:p>
+        </p:txBody>
+      </p:sp>
+    </p:spTree>
+    <p:extLst>
+      <p:ext uri="{BB962C8B-B14F-4D97-AF65-F5344CB8AC3E}">
+        <p14:creationId xmlns:p14="http://schemas.microsoft.com/office/powerpoint/2010/main" val="563156703"/>
+      </p:ext>
+    </p:extLst>
+  </p:cSld>
+  <p:clrMapOvr>
+    <a:masterClrMapping/>
+  </p:clrMapOvr>
+</p:sld>
+</file>
+
+<file path=ppt/slides/slide27.xml><?xml version="1.0" encoding="utf-8"?>
+<p:sld xmlns:a="http://schemas.openxmlformats.org/drawingml/2006/main" xmlns:r="http://schemas.openxmlformats.org/officeDocument/2006/relationships" xmlns:p="http://schemas.openxmlformats.org/presentationml/2006/main">
+  <p:cSld>
+    <p:spTree>
+      <p:nvGrpSpPr>
+        <p:cNvPr id="1" name=""/>
+        <p:cNvGrpSpPr/>
+        <p:nvPr/>
+      </p:nvGrpSpPr>
+      <p:grpSpPr>
+        <a:xfrm>
+          <a:off x="0" y="0"/>
+          <a:ext cx="0" cy="0"/>
+          <a:chOff x="0" y="0"/>
+          <a:chExt cx="0" cy="0"/>
+        </a:xfrm>
+      </p:grpSpPr>
+      <p:grpSp>
+        <p:nvGrpSpPr>
+          <p:cNvPr id="15" name="Group 14">
+            <a:extLst>
+              <a:ext uri="{FF2B5EF4-FFF2-40B4-BE49-F238E27FC236}">
+                <a16:creationId xmlns:a16="http://schemas.microsoft.com/office/drawing/2014/main" id="{D9045DBC-F69C-4AC9-B3A3-9E3551DB0561}"/>
+              </a:ext>
+            </a:extLst>
+          </p:cNvPr>
+          <p:cNvGrpSpPr/>
+          <p:nvPr/>
+        </p:nvGrpSpPr>
+        <p:grpSpPr>
+          <a:xfrm>
+            <a:off x="0" y="23430"/>
+            <a:ext cx="12192000" cy="6655665"/>
+            <a:chOff x="0" y="23431"/>
+            <a:chExt cx="13059086" cy="6322580"/>
+          </a:xfrm>
+        </p:grpSpPr>
+        <p:pic>
+          <p:nvPicPr>
+            <p:cNvPr id="6" name="Picture 5">
+              <a:extLst>
+                <a:ext uri="{FF2B5EF4-FFF2-40B4-BE49-F238E27FC236}">
+                  <a16:creationId xmlns:a16="http://schemas.microsoft.com/office/drawing/2014/main" id="{068EE881-6492-4209-BE60-64266DA1F796}"/>
+                </a:ext>
+              </a:extLst>
+            </p:cNvPr>
+            <p:cNvPicPr>
+              <a:picLocks noChangeAspect="1"/>
+            </p:cNvPicPr>
+            <p:nvPr/>
+          </p:nvPicPr>
+          <p:blipFill>
+            <a:blip r:embed="rId2"/>
+            <a:stretch>
+              <a:fillRect/>
+            </a:stretch>
+          </p:blipFill>
+          <p:spPr>
+            <a:xfrm>
+              <a:off x="0" y="23432"/>
+              <a:ext cx="6482295" cy="2096352"/>
+            </a:xfrm>
+            <a:prstGeom prst="rect">
+              <a:avLst/>
+            </a:prstGeom>
+          </p:spPr>
+        </p:pic>
+        <p:pic>
+          <p:nvPicPr>
+            <p:cNvPr id="7" name="Picture 6">
+              <a:extLst>
+                <a:ext uri="{FF2B5EF4-FFF2-40B4-BE49-F238E27FC236}">
+                  <a16:creationId xmlns:a16="http://schemas.microsoft.com/office/drawing/2014/main" id="{A564882B-39D7-4C38-B45D-C424FF23F4C1}"/>
+                </a:ext>
+              </a:extLst>
+            </p:cNvPr>
+            <p:cNvPicPr>
+              <a:picLocks noChangeAspect="1"/>
+            </p:cNvPicPr>
+            <p:nvPr/>
+          </p:nvPicPr>
+          <p:blipFill>
+            <a:blip r:embed="rId3"/>
+            <a:stretch>
+              <a:fillRect/>
+            </a:stretch>
+          </p:blipFill>
+          <p:spPr>
+            <a:xfrm>
+              <a:off x="0" y="2119784"/>
+              <a:ext cx="6491072" cy="2112688"/>
+            </a:xfrm>
+            <a:prstGeom prst="rect">
+              <a:avLst/>
+            </a:prstGeom>
+          </p:spPr>
+        </p:pic>
+        <p:pic>
+          <p:nvPicPr>
+            <p:cNvPr id="10" name="Picture 9">
+              <a:extLst>
+                <a:ext uri="{FF2B5EF4-FFF2-40B4-BE49-F238E27FC236}">
+                  <a16:creationId xmlns:a16="http://schemas.microsoft.com/office/drawing/2014/main" id="{3D253616-2916-4301-881C-AEF5B78A1186}"/>
+                </a:ext>
+              </a:extLst>
+            </p:cNvPr>
+            <p:cNvPicPr>
+              <a:picLocks noChangeAspect="1"/>
+            </p:cNvPicPr>
+            <p:nvPr/>
+          </p:nvPicPr>
+          <p:blipFill>
+            <a:blip r:embed="rId4"/>
+            <a:stretch>
+              <a:fillRect/>
+            </a:stretch>
+          </p:blipFill>
+          <p:spPr>
+            <a:xfrm>
+              <a:off x="0" y="4232473"/>
+              <a:ext cx="6523630" cy="2113538"/>
+            </a:xfrm>
+            <a:prstGeom prst="rect">
+              <a:avLst/>
+            </a:prstGeom>
+          </p:spPr>
+        </p:pic>
+        <p:pic>
+          <p:nvPicPr>
+            <p:cNvPr id="12" name="Picture 11">
+              <a:extLst>
+                <a:ext uri="{FF2B5EF4-FFF2-40B4-BE49-F238E27FC236}">
+                  <a16:creationId xmlns:a16="http://schemas.microsoft.com/office/drawing/2014/main" id="{55BB646B-3821-467F-9F36-136628842A9E}"/>
+                </a:ext>
+              </a:extLst>
+            </p:cNvPr>
+            <p:cNvPicPr>
+              <a:picLocks noChangeAspect="1"/>
+            </p:cNvPicPr>
+            <p:nvPr/>
+          </p:nvPicPr>
+          <p:blipFill>
+            <a:blip r:embed="rId5"/>
+            <a:stretch>
+              <a:fillRect/>
+            </a:stretch>
+          </p:blipFill>
+          <p:spPr>
+            <a:xfrm>
+              <a:off x="6482295" y="23431"/>
+              <a:ext cx="6478131" cy="2112688"/>
+            </a:xfrm>
+            <a:prstGeom prst="rect">
+              <a:avLst/>
+            </a:prstGeom>
+          </p:spPr>
+        </p:pic>
+        <p:pic>
+          <p:nvPicPr>
+            <p:cNvPr id="13" name="Picture 12">
+              <a:extLst>
+                <a:ext uri="{FF2B5EF4-FFF2-40B4-BE49-F238E27FC236}">
+                  <a16:creationId xmlns:a16="http://schemas.microsoft.com/office/drawing/2014/main" id="{72AEFBB3-2944-498E-92C4-599DFE627993}"/>
+                </a:ext>
+              </a:extLst>
+            </p:cNvPr>
+            <p:cNvPicPr>
+              <a:picLocks noChangeAspect="1"/>
+            </p:cNvPicPr>
+            <p:nvPr/>
+          </p:nvPicPr>
+          <p:blipFill>
+            <a:blip r:embed="rId6"/>
+            <a:stretch>
+              <a:fillRect/>
+            </a:stretch>
+          </p:blipFill>
+          <p:spPr>
+            <a:xfrm>
+              <a:off x="6482294" y="2081526"/>
+              <a:ext cx="6576792" cy="2096352"/>
+            </a:xfrm>
+            <a:prstGeom prst="rect">
+              <a:avLst/>
+            </a:prstGeom>
+          </p:spPr>
+        </p:pic>
+        <p:pic>
+          <p:nvPicPr>
+            <p:cNvPr id="14" name="Picture 13">
+              <a:extLst>
+                <a:ext uri="{FF2B5EF4-FFF2-40B4-BE49-F238E27FC236}">
+                  <a16:creationId xmlns:a16="http://schemas.microsoft.com/office/drawing/2014/main" id="{7247AEF4-8136-4CB4-9C66-C1D52BD058A1}"/>
+                </a:ext>
+              </a:extLst>
+            </p:cNvPr>
+            <p:cNvPicPr>
+              <a:picLocks noChangeAspect="1"/>
+            </p:cNvPicPr>
+            <p:nvPr/>
+          </p:nvPicPr>
+          <p:blipFill>
+            <a:blip r:embed="rId7"/>
+            <a:stretch>
+              <a:fillRect/>
+            </a:stretch>
+          </p:blipFill>
+          <p:spPr>
+            <a:xfrm>
+              <a:off x="6536882" y="4272229"/>
+              <a:ext cx="6522204" cy="2036344"/>
+            </a:xfrm>
+            <a:prstGeom prst="rect">
+              <a:avLst/>
+            </a:prstGeom>
+          </p:spPr>
+        </p:pic>
+      </p:grpSp>
+    </p:spTree>
+    <p:extLst>
+      <p:ext uri="{BB962C8B-B14F-4D97-AF65-F5344CB8AC3E}">
+        <p14:creationId xmlns:p14="http://schemas.microsoft.com/office/powerpoint/2010/main" val="3726362488"/>
+      </p:ext>
+    </p:extLst>
+  </p:cSld>
+  <p:clrMapOvr>
+    <a:masterClrMapping/>
+  </p:clrMapOvr>
+</p:sld>
+</file>
+
+<file path=ppt/slides/slide28.xml><?xml version="1.0" encoding="utf-8"?>
+<p:sld xmlns:a="http://schemas.openxmlformats.org/drawingml/2006/main" xmlns:r="http://schemas.openxmlformats.org/officeDocument/2006/relationships" xmlns:p="http://schemas.openxmlformats.org/presentationml/2006/main">
+  <p:cSld>
+    <p:spTree>
+      <p:nvGrpSpPr>
+        <p:cNvPr id="1" name=""/>
+        <p:cNvGrpSpPr/>
+        <p:nvPr/>
+      </p:nvGrpSpPr>
+      <p:grpSpPr>
+        <a:xfrm>
+          <a:off x="0" y="0"/>
+          <a:ext cx="0" cy="0"/>
+          <a:chOff x="0" y="0"/>
+          <a:chExt cx="0" cy="0"/>
+        </a:xfrm>
+      </p:grpSpPr>
+      <p:sp>
+        <p:nvSpPr>
+          <p:cNvPr id="2" name="Title 1">
+            <a:extLst>
+              <a:ext uri="{FF2B5EF4-FFF2-40B4-BE49-F238E27FC236}">
+                <a16:creationId xmlns:a16="http://schemas.microsoft.com/office/drawing/2014/main" id="{60460397-207A-4693-821A-30DCCCD3A8CB}"/>
+              </a:ext>
+            </a:extLst>
+          </p:cNvPr>
+          <p:cNvSpPr>
+            <a:spLocks noGrp="1"/>
+          </p:cNvSpPr>
+          <p:nvPr>
+            <p:ph type="title"/>
+          </p:nvPr>
+        </p:nvSpPr>
+        <p:spPr/>
+        <p:txBody>
+          <a:bodyPr/>
+          <a:lstStyle/>
+          <a:p>
+            <a:r>
+              <a:rPr lang="en-US" dirty="0"/>
+              <a:t>Applying to DFT Paper – State Tomography</a:t>
+            </a:r>
+            <a:endParaRPr lang="en-GB" dirty="0"/>
+          </a:p>
+        </p:txBody>
+      </p:sp>
+      <p:sp>
+        <p:nvSpPr>
+          <p:cNvPr id="3" name="Content Placeholder 2">
+            <a:extLst>
+              <a:ext uri="{FF2B5EF4-FFF2-40B4-BE49-F238E27FC236}">
+                <a16:creationId xmlns:a16="http://schemas.microsoft.com/office/drawing/2014/main" id="{392EB81F-6F33-488B-8C0D-ECCE50271FE0}"/>
+              </a:ext>
+            </a:extLst>
+          </p:cNvPr>
+          <p:cNvSpPr>
+            <a:spLocks noGrp="1"/>
+          </p:cNvSpPr>
+          <p:nvPr>
+            <p:ph idx="1"/>
+          </p:nvPr>
+        </p:nvSpPr>
+        <p:spPr>
+          <a:xfrm>
+            <a:off x="705678" y="1375051"/>
+            <a:ext cx="11199810" cy="4351338"/>
+          </a:xfrm>
+        </p:spPr>
+        <p:txBody>
+          <a:bodyPr/>
+          <a:lstStyle/>
+          <a:p>
+            <a:r>
+              <a:rPr lang="en-US" dirty="0"/>
+              <a:t>Based on reliable nature of calibration schedule and overall error characteristics, decided to use gate 0 (along with 1 for 2 qubit circuit) for DFT paper. Stored results with detailed information about execution</a:t>
+            </a:r>
+            <a:endParaRPr lang="en-GB" dirty="0"/>
+          </a:p>
+          <a:p>
+            <a:r>
+              <a:rPr lang="en-GB" dirty="0"/>
+              <a:t>For error modelling purposes also ran the circuits in such a way that they had the same number of gates and duration, so error is homoscedastic.</a:t>
+            </a:r>
+          </a:p>
+          <a:p>
+            <a:r>
+              <a:rPr lang="en-GB" dirty="0"/>
+              <a:t>Obtained E0 = -0.917 (exact: -1.247) and E0 = -1.438 (exact: -1.795) for the two experiments.</a:t>
+            </a:r>
+          </a:p>
+          <a:p>
+            <a:endParaRPr lang="en-US" dirty="0"/>
+          </a:p>
+        </p:txBody>
+      </p:sp>
+      <p:pic>
+        <p:nvPicPr>
+          <p:cNvPr id="4" name="Picture 3">
+            <a:extLst>
+              <a:ext uri="{FF2B5EF4-FFF2-40B4-BE49-F238E27FC236}">
+                <a16:creationId xmlns:a16="http://schemas.microsoft.com/office/drawing/2014/main" id="{EE0DAD59-3DE0-49BA-AA41-20CE46247D74}"/>
+              </a:ext>
+            </a:extLst>
+          </p:cNvPr>
+          <p:cNvPicPr>
+            <a:picLocks noChangeAspect="1"/>
+          </p:cNvPicPr>
+          <p:nvPr/>
+        </p:nvPicPr>
+        <p:blipFill>
+          <a:blip r:embed="rId2"/>
+          <a:stretch>
+            <a:fillRect/>
+          </a:stretch>
+        </p:blipFill>
+        <p:spPr>
+          <a:xfrm>
+            <a:off x="7205472" y="4253966"/>
+            <a:ext cx="4767072" cy="1472423"/>
+          </a:xfrm>
+          <a:prstGeom prst="rect">
+            <a:avLst/>
+          </a:prstGeom>
+        </p:spPr>
+      </p:pic>
+      <p:sp>
+        <p:nvSpPr>
+          <p:cNvPr id="5" name="Content Placeholder 2">
+            <a:extLst>
+              <a:ext uri="{FF2B5EF4-FFF2-40B4-BE49-F238E27FC236}">
+                <a16:creationId xmlns:a16="http://schemas.microsoft.com/office/drawing/2014/main" id="{62290C45-740A-4AA3-9F5F-E8193377C2EF}"/>
+              </a:ext>
+            </a:extLst>
+          </p:cNvPr>
+          <p:cNvSpPr txBox="1">
+            <a:spLocks/>
+          </p:cNvSpPr>
+          <p:nvPr/>
+        </p:nvSpPr>
+        <p:spPr>
+          <a:xfrm>
+            <a:off x="7836408" y="5726389"/>
+            <a:ext cx="4683186" cy="515386"/>
+          </a:xfrm>
+          <a:prstGeom prst="rect">
+            <a:avLst/>
+          </a:prstGeom>
+        </p:spPr>
+        <p:txBody>
+          <a:bodyPr vert="horz" lIns="91440" tIns="45720" rIns="91440" bIns="45720" rtlCol="0">
+            <a:normAutofit/>
+          </a:bodyPr>
+          <a:lstStyle>
+            <a:lvl1pPr marL="228600" indent="-228600" algn="l" defTabSz="914400" rtl="0" eaLnBrk="1" latinLnBrk="0" hangingPunct="1">
+              <a:lnSpc>
+                <a:spcPct val="90000"/>
+              </a:lnSpc>
+              <a:spcBef>
+                <a:spcPts val="1000"/>
+              </a:spcBef>
+              <a:buFont typeface="Arial" panose="020B0604020202020204" pitchFamily="34" charset="0"/>
+              <a:buChar char="•"/>
+              <a:defRPr sz="2800" kern="1200">
+                <a:solidFill>
+                  <a:schemeClr val="tx1"/>
+                </a:solidFill>
+                <a:latin typeface="+mn-lt"/>
+                <a:ea typeface="+mn-ea"/>
+                <a:cs typeface="+mn-cs"/>
+              </a:defRPr>
+            </a:lvl1pPr>
+            <a:lvl2pPr marL="685800" indent="-228600" algn="l" defTabSz="914400" rtl="0" eaLnBrk="1" latinLnBrk="0" hangingPunct="1">
+              <a:lnSpc>
+                <a:spcPct val="90000"/>
+              </a:lnSpc>
+              <a:spcBef>
+                <a:spcPts val="500"/>
+              </a:spcBef>
+              <a:buFont typeface="Arial" panose="020B0604020202020204" pitchFamily="34" charset="0"/>
+              <a:buChar char="•"/>
+              <a:defRPr sz="2400" kern="1200">
+                <a:solidFill>
+                  <a:schemeClr val="tx1"/>
+                </a:solidFill>
+                <a:latin typeface="+mn-lt"/>
+                <a:ea typeface="+mn-ea"/>
+                <a:cs typeface="+mn-cs"/>
+              </a:defRPr>
+            </a:lvl2pPr>
+            <a:lvl3pPr marL="1143000" indent="-228600" algn="l" defTabSz="914400" rtl="0" eaLnBrk="1" latinLnBrk="0" hangingPunct="1">
+              <a:lnSpc>
+                <a:spcPct val="90000"/>
+              </a:lnSpc>
+              <a:spcBef>
+                <a:spcPts val="500"/>
+              </a:spcBef>
+              <a:buFont typeface="Arial" panose="020B0604020202020204" pitchFamily="34" charset="0"/>
+              <a:buChar char="•"/>
+              <a:defRPr sz="2000" kern="1200">
+                <a:solidFill>
+                  <a:schemeClr val="tx1"/>
+                </a:solidFill>
+                <a:latin typeface="+mn-lt"/>
+                <a:ea typeface="+mn-ea"/>
+                <a:cs typeface="+mn-cs"/>
+              </a:defRPr>
+            </a:lvl3pPr>
+            <a:lvl4pPr marL="1600200" indent="-228600" algn="l" defTabSz="914400" rtl="0" eaLnBrk="1" latinLnBrk="0" hangingPunct="1">
+              <a:lnSpc>
+                <a:spcPct val="90000"/>
+              </a:lnSpc>
+              <a:spcBef>
+                <a:spcPts val="500"/>
+              </a:spcBef>
+              <a:buFont typeface="Arial" panose="020B0604020202020204" pitchFamily="34" charset="0"/>
+              <a:buChar char="•"/>
+              <a:defRPr sz="1800" kern="1200">
+                <a:solidFill>
+                  <a:schemeClr val="tx1"/>
+                </a:solidFill>
+                <a:latin typeface="+mn-lt"/>
+                <a:ea typeface="+mn-ea"/>
+                <a:cs typeface="+mn-cs"/>
+              </a:defRPr>
+            </a:lvl4pPr>
+            <a:lvl5pPr marL="2057400" indent="-228600" algn="l" defTabSz="914400" rtl="0" eaLnBrk="1" latinLnBrk="0" hangingPunct="1">
+              <a:lnSpc>
+                <a:spcPct val="90000"/>
+              </a:lnSpc>
+              <a:spcBef>
+                <a:spcPts val="500"/>
+              </a:spcBef>
+              <a:buFont typeface="Arial" panose="020B0604020202020204" pitchFamily="34" charset="0"/>
+              <a:buChar char="•"/>
+              <a:defRPr sz="1800" kern="1200">
+                <a:solidFill>
+                  <a:schemeClr val="tx1"/>
+                </a:solidFill>
+                <a:latin typeface="+mn-lt"/>
+                <a:ea typeface="+mn-ea"/>
+                <a:cs typeface="+mn-cs"/>
+              </a:defRPr>
+            </a:lvl5pPr>
+            <a:lvl6pPr marL="2514600" indent="-228600" algn="l" defTabSz="914400" rtl="0" eaLnBrk="1" latinLnBrk="0" hangingPunct="1">
+              <a:lnSpc>
+                <a:spcPct val="90000"/>
+              </a:lnSpc>
+              <a:spcBef>
+                <a:spcPts val="500"/>
+              </a:spcBef>
+              <a:buFont typeface="Arial" panose="020B0604020202020204" pitchFamily="34" charset="0"/>
+              <a:buChar char="•"/>
+              <a:defRPr sz="1800" kern="1200">
+                <a:solidFill>
+                  <a:schemeClr val="tx1"/>
+                </a:solidFill>
+                <a:latin typeface="+mn-lt"/>
+                <a:ea typeface="+mn-ea"/>
+                <a:cs typeface="+mn-cs"/>
+              </a:defRPr>
+            </a:lvl6pPr>
+            <a:lvl7pPr marL="2971800" indent="-228600" algn="l" defTabSz="914400" rtl="0" eaLnBrk="1" latinLnBrk="0" hangingPunct="1">
+              <a:lnSpc>
+                <a:spcPct val="90000"/>
+              </a:lnSpc>
+              <a:spcBef>
+                <a:spcPts val="500"/>
+              </a:spcBef>
+              <a:buFont typeface="Arial" panose="020B0604020202020204" pitchFamily="34" charset="0"/>
+              <a:buChar char="•"/>
+              <a:defRPr sz="1800" kern="1200">
+                <a:solidFill>
+                  <a:schemeClr val="tx1"/>
+                </a:solidFill>
+                <a:latin typeface="+mn-lt"/>
+                <a:ea typeface="+mn-ea"/>
+                <a:cs typeface="+mn-cs"/>
+              </a:defRPr>
+            </a:lvl7pPr>
+            <a:lvl8pPr marL="3429000" indent="-228600" algn="l" defTabSz="914400" rtl="0" eaLnBrk="1" latinLnBrk="0" hangingPunct="1">
+              <a:lnSpc>
+                <a:spcPct val="90000"/>
+              </a:lnSpc>
+              <a:spcBef>
+                <a:spcPts val="500"/>
+              </a:spcBef>
+              <a:buFont typeface="Arial" panose="020B0604020202020204" pitchFamily="34" charset="0"/>
+              <a:buChar char="•"/>
+              <a:defRPr sz="1800" kern="1200">
+                <a:solidFill>
+                  <a:schemeClr val="tx1"/>
+                </a:solidFill>
+                <a:latin typeface="+mn-lt"/>
+                <a:ea typeface="+mn-ea"/>
+                <a:cs typeface="+mn-cs"/>
+              </a:defRPr>
+            </a:lvl8pPr>
+            <a:lvl9pPr marL="3886200" indent="-228600" algn="l" defTabSz="914400" rtl="0" eaLnBrk="1" latinLnBrk="0" hangingPunct="1">
+              <a:lnSpc>
+                <a:spcPct val="90000"/>
+              </a:lnSpc>
+              <a:spcBef>
+                <a:spcPts val="500"/>
+              </a:spcBef>
+              <a:buFont typeface="Arial" panose="020B0604020202020204" pitchFamily="34" charset="0"/>
+              <a:buChar char="•"/>
+              <a:defRPr sz="1800" kern="1200">
+                <a:solidFill>
+                  <a:schemeClr val="tx1"/>
+                </a:solidFill>
+                <a:latin typeface="+mn-lt"/>
+                <a:ea typeface="+mn-ea"/>
+                <a:cs typeface="+mn-cs"/>
+              </a:defRPr>
+            </a:lvl9pPr>
+          </a:lstStyle>
+          <a:p>
+            <a:pPr marL="0" indent="0">
+              <a:buNone/>
+            </a:pPr>
+            <a:r>
+              <a:rPr lang="en-US" sz="1600" dirty="0" err="1"/>
+              <a:t>Eg</a:t>
+            </a:r>
+            <a:r>
+              <a:rPr lang="en-US" sz="1600" dirty="0"/>
+              <a:t> measuring a </a:t>
+            </a:r>
+            <a:r>
+              <a:rPr lang="en-US" sz="1600" dirty="0" err="1"/>
+              <a:t>sigma_y</a:t>
+            </a:r>
+            <a:r>
+              <a:rPr lang="en-US" sz="1600" dirty="0"/>
+              <a:t> here</a:t>
+            </a:r>
+          </a:p>
+        </p:txBody>
+      </p:sp>
+    </p:spTree>
+    <p:extLst>
+      <p:ext uri="{BB962C8B-B14F-4D97-AF65-F5344CB8AC3E}">
+        <p14:creationId xmlns:p14="http://schemas.microsoft.com/office/powerpoint/2010/main" val="1842836331"/>
+      </p:ext>
+    </p:extLst>
+  </p:cSld>
+  <p:clrMapOvr>
+    <a:masterClrMapping/>
+  </p:clrMapOvr>
+</p:sld>
+</file>
+
+<file path=ppt/slides/slide29.xml><?xml version="1.0" encoding="utf-8"?>
+<p:sld xmlns:a="http://schemas.openxmlformats.org/drawingml/2006/main" xmlns:r="http://schemas.openxmlformats.org/officeDocument/2006/relationships" xmlns:p="http://schemas.openxmlformats.org/presentationml/2006/main">
+  <p:cSld>
+    <p:spTree>
+      <p:nvGrpSpPr>
+        <p:cNvPr id="1" name=""/>
+        <p:cNvGrpSpPr/>
+        <p:nvPr/>
+      </p:nvGrpSpPr>
+      <p:grpSpPr>
+        <a:xfrm>
+          <a:off x="0" y="0"/>
+          <a:ext cx="0" cy="0"/>
+          <a:chOff x="0" y="0"/>
+          <a:chExt cx="0" cy="0"/>
+        </a:xfrm>
+      </p:grpSpPr>
+      <p:sp>
+        <p:nvSpPr>
+          <p:cNvPr id="2" name="Title 1">
+            <a:extLst>
+              <a:ext uri="{FF2B5EF4-FFF2-40B4-BE49-F238E27FC236}">
+                <a16:creationId xmlns:a16="http://schemas.microsoft.com/office/drawing/2014/main" id="{00B43AD7-98CA-4B8E-B83C-2EB384227646}"/>
+              </a:ext>
+            </a:extLst>
+          </p:cNvPr>
+          <p:cNvSpPr>
+            <a:spLocks noGrp="1"/>
+          </p:cNvSpPr>
+          <p:nvPr>
+            <p:ph type="title"/>
+          </p:nvPr>
+        </p:nvSpPr>
+        <p:spPr/>
+        <p:txBody>
+          <a:bodyPr/>
+          <a:lstStyle/>
+          <a:p>
+            <a:r>
+              <a:rPr lang="en-US" dirty="0"/>
+              <a:t>Applying to DFT Paper – Fitting Errors</a:t>
+            </a:r>
+            <a:endParaRPr lang="en-GB" dirty="0"/>
+          </a:p>
+        </p:txBody>
+      </p:sp>
+      <p:sp>
+        <p:nvSpPr>
+          <p:cNvPr id="3" name="Content Placeholder 2">
+            <a:extLst>
+              <a:ext uri="{FF2B5EF4-FFF2-40B4-BE49-F238E27FC236}">
+                <a16:creationId xmlns:a16="http://schemas.microsoft.com/office/drawing/2014/main" id="{62DEFA2D-ED57-4F84-8899-6D81A7CE3104}"/>
+              </a:ext>
+            </a:extLst>
+          </p:cNvPr>
+          <p:cNvSpPr>
+            <a:spLocks noGrp="1"/>
+          </p:cNvSpPr>
+          <p:nvPr>
+            <p:ph idx="1"/>
+          </p:nvPr>
+        </p:nvSpPr>
+        <p:spPr/>
+        <p:txBody>
+          <a:bodyPr/>
+          <a:lstStyle/>
+          <a:p>
+            <a:r>
+              <a:rPr lang="en-US" dirty="0"/>
+              <a:t>How to do this??</a:t>
+            </a:r>
+            <a:endParaRPr lang="en-GB" dirty="0"/>
+          </a:p>
+        </p:txBody>
+      </p:sp>
+    </p:spTree>
+    <p:extLst>
+      <p:ext uri="{BB962C8B-B14F-4D97-AF65-F5344CB8AC3E}">
+        <p14:creationId xmlns:p14="http://schemas.microsoft.com/office/powerpoint/2010/main" val="3944327097"/>
       </p:ext>
     </p:extLst>
   </p:cSld>
@@ -7441,6 +9693,130 @@
     <p:extLst>
       <p:ext uri="{BB962C8B-B14F-4D97-AF65-F5344CB8AC3E}">
         <p14:creationId xmlns:p14="http://schemas.microsoft.com/office/powerpoint/2010/main" val="2044165274"/>
+      </p:ext>
+    </p:extLst>
+  </p:cSld>
+  <p:clrMapOvr>
+    <a:masterClrMapping/>
+  </p:clrMapOvr>
+</p:sld>
+</file>
+
+<file path=ppt/slides/slide30.xml><?xml version="1.0" encoding="utf-8"?>
+<p:sld xmlns:a="http://schemas.openxmlformats.org/drawingml/2006/main" xmlns:r="http://schemas.openxmlformats.org/officeDocument/2006/relationships" xmlns:p="http://schemas.openxmlformats.org/presentationml/2006/main">
+  <p:cSld>
+    <p:spTree>
+      <p:nvGrpSpPr>
+        <p:cNvPr id="1" name=""/>
+        <p:cNvGrpSpPr/>
+        <p:nvPr/>
+      </p:nvGrpSpPr>
+      <p:grpSpPr>
+        <a:xfrm>
+          <a:off x="0" y="0"/>
+          <a:ext cx="0" cy="0"/>
+          <a:chOff x="0" y="0"/>
+          <a:chExt cx="0" cy="0"/>
+        </a:xfrm>
+      </p:grpSpPr>
+      <p:sp>
+        <p:nvSpPr>
+          <p:cNvPr id="2" name="Title 1">
+            <a:extLst>
+              <a:ext uri="{FF2B5EF4-FFF2-40B4-BE49-F238E27FC236}">
+                <a16:creationId xmlns:a16="http://schemas.microsoft.com/office/drawing/2014/main" id="{A8B8131F-68B2-47CA-A578-BAC440340A2C}"/>
+              </a:ext>
+            </a:extLst>
+          </p:cNvPr>
+          <p:cNvSpPr>
+            <a:spLocks noGrp="1"/>
+          </p:cNvSpPr>
+          <p:nvPr>
+            <p:ph type="title"/>
+          </p:nvPr>
+        </p:nvSpPr>
+        <p:spPr/>
+        <p:txBody>
+          <a:bodyPr/>
+          <a:lstStyle/>
+          <a:p>
+            <a:r>
+              <a:rPr lang="en-US" dirty="0"/>
+              <a:t>Further ideas &amp; Research</a:t>
+            </a:r>
+            <a:endParaRPr lang="en-GB" dirty="0"/>
+          </a:p>
+        </p:txBody>
+      </p:sp>
+      <p:sp>
+        <p:nvSpPr>
+          <p:cNvPr id="3" name="Content Placeholder 2">
+            <a:extLst>
+              <a:ext uri="{FF2B5EF4-FFF2-40B4-BE49-F238E27FC236}">
+                <a16:creationId xmlns:a16="http://schemas.microsoft.com/office/drawing/2014/main" id="{E3ED8E95-F065-4FC0-8E66-31032FAC5DB9}"/>
+              </a:ext>
+            </a:extLst>
+          </p:cNvPr>
+          <p:cNvSpPr>
+            <a:spLocks noGrp="1"/>
+          </p:cNvSpPr>
+          <p:nvPr>
+            <p:ph idx="1"/>
+          </p:nvPr>
+        </p:nvSpPr>
+        <p:spPr/>
+        <p:txBody>
+          <a:bodyPr/>
+          <a:lstStyle/>
+          <a:p>
+            <a:r>
+              <a:rPr lang="en-GB" dirty="0"/>
+              <a:t>IBM lists ‘basis gates’ which all circuits are decomposed into at </a:t>
+            </a:r>
+            <a:r>
+              <a:rPr lang="en-GB" dirty="0" err="1"/>
+              <a:t>OpenQASM</a:t>
+            </a:r>
+            <a:r>
+              <a:rPr lang="en-GB" dirty="0"/>
+              <a:t> level, but at Pulse level all machines are using RX (using Pulse calibrations demonstrated earlier), RZ (or ‘U1’) which is implemented via software and CX to generate entanglement. From ‘Quantum Algorithm Implementations for Beginners’ (</a:t>
+            </a:r>
+            <a:r>
+              <a:rPr lang="en-GB" dirty="0">
+                <a:hlinkClick r:id="rId2"/>
+              </a:rPr>
+              <a:t>https://arxiv.org/pdf/1804.03719.pdf</a:t>
+            </a:r>
+            <a:r>
+              <a:rPr lang="en-GB" dirty="0"/>
+              <a:t>).</a:t>
+            </a:r>
+          </a:p>
+          <a:p>
+            <a:r>
+              <a:rPr lang="en-GB" dirty="0"/>
+              <a:t>This paper on page 4 has an exact method to determine the Kraus operators (chi matrix) of a quantum gate (for 1 qubit): </a:t>
+            </a:r>
+            <a:r>
+              <a:rPr lang="en-GB" dirty="0">
+                <a:hlinkClick r:id="rId3"/>
+              </a:rPr>
+              <a:t>https://arxiv.org/pdf/1805.07185.pdf</a:t>
+            </a:r>
+            <a:r>
+              <a:rPr lang="en-GB" dirty="0"/>
+              <a:t> Phys Lett A</a:t>
+            </a:r>
+          </a:p>
+          <a:p>
+            <a:endParaRPr lang="en-GB" dirty="0"/>
+          </a:p>
+        </p:txBody>
+      </p:sp>
+    </p:spTree>
+    <p:extLst>
+      <p:ext uri="{BB962C8B-B14F-4D97-AF65-F5344CB8AC3E}">
+        <p14:creationId xmlns:p14="http://schemas.microsoft.com/office/powerpoint/2010/main" val="1720655337"/>
       </p:ext>
     </p:extLst>
   </p:cSld>

</xml_diff>